<commit_message>
revamp countries, add prov & states, pop:prov table
</commit_message>
<xml_diff>
--- a/docu/00_concept.pptx
+++ b/docu/00_concept.pptx
@@ -6,11 +6,12 @@
   </p:sldMasterIdLst>
   <p:sldIdLst>
     <p:sldId id="257" r:id="rId2"/>
+    <p:sldId id="258" r:id="rId3"/>
   </p:sldIdLst>
   <p:sldSz cx="12192000" cy="6858000"/>
   <p:notesSz cx="6858000" cy="9144000"/>
   <p:custDataLst>
-    <p:tags r:id="rId3"/>
+    <p:tags r:id="rId4"/>
   </p:custDataLst>
   <p:defaultTextStyle>
     <a:defPPr>
@@ -108,6 +109,20 @@
     </a:lvl9pPr>
   </p:defaultTextStyle>
   <p:extLst>
+    <p:ext uri="{521415D9-36F7-43E2-AB2F-B90AF26B5E84}">
+      <p14:sectionLst xmlns:p14="http://schemas.microsoft.com/office/powerpoint/2010/main">
+        <p14:section name="old" id="{B6F56A15-EC68-4FDB-A748-2AB4884B8A79}">
+          <p14:sldIdLst>
+            <p14:sldId id="257"/>
+          </p14:sldIdLst>
+        </p14:section>
+        <p14:section name="imperator" id="{526B28B9-53ED-413B-9B68-FC2009F7BD37}">
+          <p14:sldIdLst>
+            <p14:sldId id="258"/>
+          </p14:sldIdLst>
+        </p14:section>
+      </p14:sectionLst>
+    </p:ext>
     <p:ext uri="{EFAFB233-063F-42B5-8137-9DF3F51BA10A}">
       <p15:sldGuideLst xmlns:p15="http://schemas.microsoft.com/office/powerpoint/2012/main">
         <p15:guide id="1" orient="horz" pos="2160" userDrawn="1">
@@ -375,7 +390,7 @@
           <a:p>
             <a:fld id="{AA785629-72FB-4BD8-A888-872F3B8BC806}" type="datetimeFigureOut">
               <a:rPr lang="en-DE" smtClean="0"/>
-              <a:t>26/05/2022</a:t>
+              <a:t>23/01/2024</a:t>
             </a:fld>
             <a:endParaRPr lang="en-DE"/>
           </a:p>
@@ -429,7 +444,7 @@
           <a:p>
             <a:fld id="{AD573DC3-912A-4ACD-B401-DCDCB70EF517}" type="slidenum">
               <a:rPr lang="en-DE" smtClean="0"/>
-              <a:t>‹#›</a:t>
+              <a:t>‹Nr.›</a:t>
             </a:fld>
             <a:endParaRPr lang="en-DE"/>
           </a:p>
@@ -575,7 +590,7 @@
           <a:p>
             <a:fld id="{AA785629-72FB-4BD8-A888-872F3B8BC806}" type="datetimeFigureOut">
               <a:rPr lang="en-DE" smtClean="0"/>
-              <a:t>26/05/2022</a:t>
+              <a:t>23/01/2024</a:t>
             </a:fld>
             <a:endParaRPr lang="en-DE"/>
           </a:p>
@@ -629,7 +644,7 @@
           <a:p>
             <a:fld id="{AD573DC3-912A-4ACD-B401-DCDCB70EF517}" type="slidenum">
               <a:rPr lang="en-DE" smtClean="0"/>
-              <a:t>‹#›</a:t>
+              <a:t>‹Nr.›</a:t>
             </a:fld>
             <a:endParaRPr lang="en-DE"/>
           </a:p>
@@ -785,7 +800,7 @@
           <a:p>
             <a:fld id="{AA785629-72FB-4BD8-A888-872F3B8BC806}" type="datetimeFigureOut">
               <a:rPr lang="en-DE" smtClean="0"/>
-              <a:t>26/05/2022</a:t>
+              <a:t>23/01/2024</a:t>
             </a:fld>
             <a:endParaRPr lang="en-DE"/>
           </a:p>
@@ -839,7 +854,7 @@
           <a:p>
             <a:fld id="{AD573DC3-912A-4ACD-B401-DCDCB70EF517}" type="slidenum">
               <a:rPr lang="en-DE" smtClean="0"/>
-              <a:t>‹#›</a:t>
+              <a:t>‹Nr.›</a:t>
             </a:fld>
             <a:endParaRPr lang="en-DE"/>
           </a:p>
@@ -985,7 +1000,7 @@
           <a:p>
             <a:fld id="{AA785629-72FB-4BD8-A888-872F3B8BC806}" type="datetimeFigureOut">
               <a:rPr lang="en-DE" smtClean="0"/>
-              <a:t>26/05/2022</a:t>
+              <a:t>23/01/2024</a:t>
             </a:fld>
             <a:endParaRPr lang="en-DE"/>
           </a:p>
@@ -1039,7 +1054,7 @@
           <a:p>
             <a:fld id="{AD573DC3-912A-4ACD-B401-DCDCB70EF517}" type="slidenum">
               <a:rPr lang="en-DE" smtClean="0"/>
-              <a:t>‹#›</a:t>
+              <a:t>‹Nr.›</a:t>
             </a:fld>
             <a:endParaRPr lang="en-DE"/>
           </a:p>
@@ -1261,7 +1276,7 @@
           <a:p>
             <a:fld id="{AA785629-72FB-4BD8-A888-872F3B8BC806}" type="datetimeFigureOut">
               <a:rPr lang="en-DE" smtClean="0"/>
-              <a:t>26/05/2022</a:t>
+              <a:t>23/01/2024</a:t>
             </a:fld>
             <a:endParaRPr lang="en-DE"/>
           </a:p>
@@ -1315,7 +1330,7 @@
           <a:p>
             <a:fld id="{AD573DC3-912A-4ACD-B401-DCDCB70EF517}" type="slidenum">
               <a:rPr lang="en-DE" smtClean="0"/>
-              <a:t>‹#›</a:t>
+              <a:t>‹Nr.›</a:t>
             </a:fld>
             <a:endParaRPr lang="en-DE"/>
           </a:p>
@@ -1529,7 +1544,7 @@
           <a:p>
             <a:fld id="{AA785629-72FB-4BD8-A888-872F3B8BC806}" type="datetimeFigureOut">
               <a:rPr lang="en-DE" smtClean="0"/>
-              <a:t>26/05/2022</a:t>
+              <a:t>23/01/2024</a:t>
             </a:fld>
             <a:endParaRPr lang="en-DE"/>
           </a:p>
@@ -1583,7 +1598,7 @@
           <a:p>
             <a:fld id="{AD573DC3-912A-4ACD-B401-DCDCB70EF517}" type="slidenum">
               <a:rPr lang="en-DE" smtClean="0"/>
-              <a:t>‹#›</a:t>
+              <a:t>‹Nr.›</a:t>
             </a:fld>
             <a:endParaRPr lang="en-DE"/>
           </a:p>
@@ -1944,7 +1959,7 @@
           <a:p>
             <a:fld id="{AA785629-72FB-4BD8-A888-872F3B8BC806}" type="datetimeFigureOut">
               <a:rPr lang="en-DE" smtClean="0"/>
-              <a:t>26/05/2022</a:t>
+              <a:t>23/01/2024</a:t>
             </a:fld>
             <a:endParaRPr lang="en-DE"/>
           </a:p>
@@ -1998,7 +2013,7 @@
           <a:p>
             <a:fld id="{AD573DC3-912A-4ACD-B401-DCDCB70EF517}" type="slidenum">
               <a:rPr lang="en-DE" smtClean="0"/>
-              <a:t>‹#›</a:t>
+              <a:t>‹Nr.›</a:t>
             </a:fld>
             <a:endParaRPr lang="en-DE"/>
           </a:p>
@@ -2086,7 +2101,7 @@
           <a:p>
             <a:fld id="{AA785629-72FB-4BD8-A888-872F3B8BC806}" type="datetimeFigureOut">
               <a:rPr lang="en-DE" smtClean="0"/>
-              <a:t>26/05/2022</a:t>
+              <a:t>23/01/2024</a:t>
             </a:fld>
             <a:endParaRPr lang="en-DE"/>
           </a:p>
@@ -2140,7 +2155,7 @@
           <a:p>
             <a:fld id="{AD573DC3-912A-4ACD-B401-DCDCB70EF517}" type="slidenum">
               <a:rPr lang="en-DE" smtClean="0"/>
-              <a:t>‹#›</a:t>
+              <a:t>‹Nr.›</a:t>
             </a:fld>
             <a:endParaRPr lang="en-DE"/>
           </a:p>
@@ -2199,7 +2214,7 @@
           <a:p>
             <a:fld id="{AA785629-72FB-4BD8-A888-872F3B8BC806}" type="datetimeFigureOut">
               <a:rPr lang="en-DE" smtClean="0"/>
-              <a:t>26/05/2022</a:t>
+              <a:t>23/01/2024</a:t>
             </a:fld>
             <a:endParaRPr lang="en-DE"/>
           </a:p>
@@ -2253,7 +2268,7 @@
           <a:p>
             <a:fld id="{AD573DC3-912A-4ACD-B401-DCDCB70EF517}" type="slidenum">
               <a:rPr lang="en-DE" smtClean="0"/>
-              <a:t>‹#›</a:t>
+              <a:t>‹Nr.›</a:t>
             </a:fld>
             <a:endParaRPr lang="en-DE"/>
           </a:p>
@@ -2512,7 +2527,7 @@
           <a:p>
             <a:fld id="{AA785629-72FB-4BD8-A888-872F3B8BC806}" type="datetimeFigureOut">
               <a:rPr lang="en-DE" smtClean="0"/>
-              <a:t>26/05/2022</a:t>
+              <a:t>23/01/2024</a:t>
             </a:fld>
             <a:endParaRPr lang="en-DE"/>
           </a:p>
@@ -2566,7 +2581,7 @@
           <a:p>
             <a:fld id="{AD573DC3-912A-4ACD-B401-DCDCB70EF517}" type="slidenum">
               <a:rPr lang="en-DE" smtClean="0"/>
-              <a:t>‹#›</a:t>
+              <a:t>‹Nr.›</a:t>
             </a:fld>
             <a:endParaRPr lang="en-DE"/>
           </a:p>
@@ -2801,7 +2816,7 @@
           <a:p>
             <a:fld id="{AA785629-72FB-4BD8-A888-872F3B8BC806}" type="datetimeFigureOut">
               <a:rPr lang="en-DE" smtClean="0"/>
-              <a:t>26/05/2022</a:t>
+              <a:t>23/01/2024</a:t>
             </a:fld>
             <a:endParaRPr lang="en-DE"/>
           </a:p>
@@ -2855,7 +2870,7 @@
           <a:p>
             <a:fld id="{AD573DC3-912A-4ACD-B401-DCDCB70EF517}" type="slidenum">
               <a:rPr lang="en-DE" smtClean="0"/>
-              <a:t>‹#›</a:t>
+              <a:t>‹Nr.›</a:t>
             </a:fld>
             <a:endParaRPr lang="en-DE"/>
           </a:p>
@@ -3044,7 +3059,7 @@
           <a:p>
             <a:fld id="{AA785629-72FB-4BD8-A888-872F3B8BC806}" type="datetimeFigureOut">
               <a:rPr lang="en-DE" smtClean="0"/>
-              <a:t>26/05/2022</a:t>
+              <a:t>23/01/2024</a:t>
             </a:fld>
             <a:endParaRPr lang="en-DE"/>
           </a:p>
@@ -3134,7 +3149,7 @@
           <a:p>
             <a:fld id="{AD573DC3-912A-4ACD-B401-DCDCB70EF517}" type="slidenum">
               <a:rPr lang="en-DE" smtClean="0"/>
-              <a:t>‹#›</a:t>
+              <a:t>‹Nr.›</a:t>
             </a:fld>
             <a:endParaRPr lang="en-DE"/>
           </a:p>
@@ -3896,6 +3911,1047 @@
 </p:sld>
 </file>
 
+<file path=ppt/slides/slide2.xml><?xml version="1.0" encoding="utf-8"?>
+<p:sld xmlns:a="http://schemas.openxmlformats.org/drawingml/2006/main" xmlns:r="http://schemas.openxmlformats.org/officeDocument/2006/relationships" xmlns:p="http://schemas.openxmlformats.org/presentationml/2006/main">
+  <p:cSld>
+    <p:spTree>
+      <p:nvGrpSpPr>
+        <p:cNvPr id="1" name=""/>
+        <p:cNvGrpSpPr/>
+        <p:nvPr/>
+      </p:nvGrpSpPr>
+      <p:grpSpPr>
+        <a:xfrm>
+          <a:off x="0" y="0"/>
+          <a:ext cx="0" cy="0"/>
+          <a:chOff x="0" y="0"/>
+          <a:chExt cx="0" cy="0"/>
+        </a:xfrm>
+      </p:grpSpPr>
+      <p:sp>
+        <p:nvSpPr>
+          <p:cNvPr id="9" name="Rechteck 8">
+            <a:extLst>
+              <a:ext uri="{FF2B5EF4-FFF2-40B4-BE49-F238E27FC236}">
+                <a16:creationId xmlns:a16="http://schemas.microsoft.com/office/drawing/2014/main" id="{010B92BD-A2BF-E572-52F2-0568ACE41148}"/>
+              </a:ext>
+            </a:extLst>
+          </p:cNvPr>
+          <p:cNvSpPr/>
+          <p:nvPr/>
+        </p:nvSpPr>
+        <p:spPr>
+          <a:xfrm>
+            <a:off x="131523" y="608008"/>
+            <a:ext cx="2624203" cy="4609578"/>
+          </a:xfrm>
+          <a:prstGeom prst="rect">
+            <a:avLst/>
+          </a:prstGeom>
+        </p:spPr>
+        <p:style>
+          <a:lnRef idx="2">
+            <a:schemeClr val="dk1">
+              <a:shade val="15000"/>
+            </a:schemeClr>
+          </a:lnRef>
+          <a:fillRef idx="1">
+            <a:schemeClr val="dk1"/>
+          </a:fillRef>
+          <a:effectRef idx="0">
+            <a:schemeClr val="dk1"/>
+          </a:effectRef>
+          <a:fontRef idx="minor">
+            <a:schemeClr val="lt1"/>
+          </a:fontRef>
+        </p:style>
+        <p:txBody>
+          <a:bodyPr rtlCol="0" anchor="t"/>
+          <a:lstStyle/>
+          <a:p>
+            <a:r>
+              <a:rPr lang="en-DE" dirty="0"/>
+              <a:t>Files &amp; Data management</a:t>
+            </a:r>
+          </a:p>
+        </p:txBody>
+      </p:sp>
+      <p:sp>
+        <p:nvSpPr>
+          <p:cNvPr id="8" name="Rechteck 7">
+            <a:extLst>
+              <a:ext uri="{FF2B5EF4-FFF2-40B4-BE49-F238E27FC236}">
+                <a16:creationId xmlns:a16="http://schemas.microsoft.com/office/drawing/2014/main" id="{696D327C-89BC-1D96-1095-9011925832EA}"/>
+              </a:ext>
+            </a:extLst>
+          </p:cNvPr>
+          <p:cNvSpPr/>
+          <p:nvPr/>
+        </p:nvSpPr>
+        <p:spPr>
+          <a:xfrm>
+            <a:off x="4149246" y="3384973"/>
+            <a:ext cx="2279737" cy="2981194"/>
+          </a:xfrm>
+          <a:prstGeom prst="rect">
+            <a:avLst/>
+          </a:prstGeom>
+        </p:spPr>
+        <p:style>
+          <a:lnRef idx="2">
+            <a:schemeClr val="accent6">
+              <a:shade val="15000"/>
+            </a:schemeClr>
+          </a:lnRef>
+          <a:fillRef idx="1">
+            <a:schemeClr val="accent6"/>
+          </a:fillRef>
+          <a:effectRef idx="0">
+            <a:schemeClr val="accent6"/>
+          </a:effectRef>
+          <a:fontRef idx="minor">
+            <a:schemeClr val="lt1"/>
+          </a:fontRef>
+        </p:style>
+        <p:txBody>
+          <a:bodyPr rtlCol="0" anchor="t"/>
+          <a:lstStyle/>
+          <a:p>
+            <a:r>
+              <a:rPr lang="en-DE" dirty="0"/>
+              <a:t>Toolbox (Map &amp; localize)</a:t>
+            </a:r>
+          </a:p>
+        </p:txBody>
+      </p:sp>
+      <p:sp>
+        <p:nvSpPr>
+          <p:cNvPr id="7" name="Rechteck 6">
+            <a:extLst>
+              <a:ext uri="{FF2B5EF4-FFF2-40B4-BE49-F238E27FC236}">
+                <a16:creationId xmlns:a16="http://schemas.microsoft.com/office/drawing/2014/main" id="{18055884-417C-DD49-DFD6-6AAD8897D1F8}"/>
+              </a:ext>
+            </a:extLst>
+          </p:cNvPr>
+          <p:cNvSpPr/>
+          <p:nvPr/>
+        </p:nvSpPr>
+        <p:spPr>
+          <a:xfrm>
+            <a:off x="4149245" y="93759"/>
+            <a:ext cx="2279737" cy="3123539"/>
+          </a:xfrm>
+          <a:prstGeom prst="rect">
+            <a:avLst/>
+          </a:prstGeom>
+        </p:spPr>
+        <p:style>
+          <a:lnRef idx="2">
+            <a:schemeClr val="accent1">
+              <a:shade val="15000"/>
+            </a:schemeClr>
+          </a:lnRef>
+          <a:fillRef idx="1">
+            <a:schemeClr val="accent1"/>
+          </a:fillRef>
+          <a:effectRef idx="0">
+            <a:schemeClr val="accent1"/>
+          </a:effectRef>
+          <a:fontRef idx="minor">
+            <a:schemeClr val="lt1"/>
+          </a:fontRef>
+        </p:style>
+        <p:txBody>
+          <a:bodyPr rtlCol="0" anchor="t"/>
+          <a:lstStyle/>
+          <a:p>
+            <a:r>
+              <a:rPr lang="en-US" dirty="0"/>
+              <a:t>E</a:t>
+            </a:r>
+            <a:r>
+              <a:rPr lang="en-DE" dirty="0" err="1"/>
+              <a:t>xtract</a:t>
+            </a:r>
+            <a:endParaRPr lang="en-DE" dirty="0"/>
+          </a:p>
+        </p:txBody>
+      </p:sp>
+      <p:sp>
+        <p:nvSpPr>
+          <p:cNvPr id="2" name="Textfeld 1">
+            <a:extLst>
+              <a:ext uri="{FF2B5EF4-FFF2-40B4-BE49-F238E27FC236}">
+                <a16:creationId xmlns:a16="http://schemas.microsoft.com/office/drawing/2014/main" id="{679BF270-4628-4B13-7856-59952DF97F8D}"/>
+              </a:ext>
+            </a:extLst>
+          </p:cNvPr>
+          <p:cNvSpPr txBox="1"/>
+          <p:nvPr/>
+        </p:nvSpPr>
+        <p:spPr>
+          <a:xfrm>
+            <a:off x="4197785" y="430195"/>
+            <a:ext cx="2002599" cy="2677656"/>
+          </a:xfrm>
+          <a:prstGeom prst="rect">
+            <a:avLst/>
+          </a:prstGeom>
+        </p:spPr>
+        <p:style>
+          <a:lnRef idx="1">
+            <a:schemeClr val="accent1"/>
+          </a:lnRef>
+          <a:fillRef idx="2">
+            <a:schemeClr val="accent1"/>
+          </a:fillRef>
+          <a:effectRef idx="1">
+            <a:schemeClr val="accent1"/>
+          </a:effectRef>
+          <a:fontRef idx="minor">
+            <a:schemeClr val="dk1"/>
+          </a:fontRef>
+        </p:style>
+        <p:txBody>
+          <a:bodyPr wrap="square" rtlCol="0">
+            <a:spAutoFit/>
+          </a:bodyPr>
+          <a:lstStyle/>
+          <a:p>
+            <a:pPr marL="285750" indent="-285750">
+              <a:buFont typeface="Arial" panose="020B0604020202020204" pitchFamily="34" charset="0"/>
+              <a:buChar char="•"/>
+            </a:pPr>
+            <a:r>
+              <a:rPr lang="en-US" sz="1200" dirty="0"/>
+              <a:t>C</a:t>
+            </a:r>
+            <a:r>
+              <a:rPr lang="en-DE" sz="1200" dirty="0" err="1"/>
+              <a:t>ountries</a:t>
+            </a:r>
+            <a:r>
+              <a:rPr lang="en-DE" sz="1200" dirty="0"/>
+              <a:t> ✅</a:t>
+            </a:r>
+          </a:p>
+          <a:p>
+            <a:pPr marL="285750" indent="-285750">
+              <a:buFont typeface="Arial" panose="020B0604020202020204" pitchFamily="34" charset="0"/>
+              <a:buChar char="•"/>
+            </a:pPr>
+            <a:r>
+              <a:rPr lang="en-US" sz="1200" dirty="0"/>
+              <a:t>S</a:t>
+            </a:r>
+            <a:r>
+              <a:rPr lang="en-DE" sz="1200" dirty="0" err="1"/>
+              <a:t>tates</a:t>
+            </a:r>
+            <a:r>
+              <a:rPr lang="en-DE" sz="1200" dirty="0"/>
+              <a:t>✅</a:t>
+            </a:r>
+          </a:p>
+          <a:p>
+            <a:pPr marL="285750" indent="-285750">
+              <a:buFont typeface="Arial" panose="020B0604020202020204" pitchFamily="34" charset="0"/>
+              <a:buChar char="•"/>
+            </a:pPr>
+            <a:r>
+              <a:rPr lang="en-US" sz="1200" dirty="0"/>
+              <a:t>P</a:t>
+            </a:r>
+            <a:r>
+              <a:rPr lang="en-DE" sz="1200" dirty="0" err="1"/>
+              <a:t>rovinces</a:t>
+            </a:r>
+            <a:r>
+              <a:rPr lang="en-DE" sz="1200" dirty="0"/>
+              <a:t>✅</a:t>
+            </a:r>
+          </a:p>
+          <a:p>
+            <a:pPr marL="285750" indent="-285750">
+              <a:buFont typeface="Arial" panose="020B0604020202020204" pitchFamily="34" charset="0"/>
+              <a:buChar char="•"/>
+            </a:pPr>
+            <a:r>
+              <a:rPr lang="en-US" sz="1200" dirty="0"/>
+              <a:t>P</a:t>
+            </a:r>
+            <a:r>
+              <a:rPr lang="en-DE" sz="1200" dirty="0"/>
+              <a:t>ops✅</a:t>
+            </a:r>
+          </a:p>
+          <a:p>
+            <a:pPr marL="285750" indent="-285750">
+              <a:buFont typeface="Arial" panose="020B0604020202020204" pitchFamily="34" charset="0"/>
+              <a:buChar char="•"/>
+            </a:pPr>
+            <a:r>
+              <a:rPr lang="en-DE" sz="1200" dirty="0"/>
+              <a:t>Wonders &amp; treasures</a:t>
+            </a:r>
+          </a:p>
+          <a:p>
+            <a:r>
+              <a:rPr lang="en-DE" sz="1200" dirty="0"/>
+              <a:t>-</a:t>
+            </a:r>
+          </a:p>
+          <a:p>
+            <a:pPr marL="285750" indent="-285750">
+              <a:buFont typeface="Arial" panose="020B0604020202020204" pitchFamily="34" charset="0"/>
+              <a:buChar char="•"/>
+            </a:pPr>
+            <a:r>
+              <a:rPr lang="en-US" sz="1200" dirty="0"/>
+              <a:t>C</a:t>
+            </a:r>
+            <a:r>
+              <a:rPr lang="en-DE" sz="1200" dirty="0" err="1"/>
+              <a:t>haracters</a:t>
+            </a:r>
+            <a:r>
+              <a:rPr lang="en-DE" sz="1200" dirty="0"/>
+              <a:t>✅</a:t>
+            </a:r>
+          </a:p>
+          <a:p>
+            <a:pPr marL="285750" indent="-285750">
+              <a:buFont typeface="Arial" panose="020B0604020202020204" pitchFamily="34" charset="0"/>
+              <a:buChar char="•"/>
+            </a:pPr>
+            <a:r>
+              <a:rPr lang="en-US" sz="1200" dirty="0"/>
+              <a:t>R</a:t>
+            </a:r>
+            <a:r>
+              <a:rPr lang="en-DE" sz="1200" dirty="0" err="1"/>
+              <a:t>uler</a:t>
+            </a:r>
+            <a:r>
+              <a:rPr lang="en-DE" sz="1200" dirty="0"/>
+              <a:t> Terms✅</a:t>
+            </a:r>
+          </a:p>
+          <a:p>
+            <a:pPr marL="285750" indent="-285750">
+              <a:buFont typeface="Arial" panose="020B0604020202020204" pitchFamily="34" charset="0"/>
+              <a:buChar char="•"/>
+            </a:pPr>
+            <a:r>
+              <a:rPr lang="en-US" sz="1200" dirty="0"/>
+              <a:t>F</a:t>
+            </a:r>
+            <a:r>
+              <a:rPr lang="en-DE" sz="1200" dirty="0" err="1"/>
+              <a:t>amilies</a:t>
+            </a:r>
+            <a:endParaRPr lang="en-DE" sz="1200" dirty="0"/>
+          </a:p>
+          <a:p>
+            <a:r>
+              <a:rPr lang="en-DE" sz="1200" dirty="0"/>
+              <a:t>-</a:t>
+            </a:r>
+          </a:p>
+          <a:p>
+            <a:pPr marL="285750" indent="-285750">
+              <a:buFont typeface="Arial" panose="020B0604020202020204" pitchFamily="34" charset="0"/>
+              <a:buChar char="•"/>
+            </a:pPr>
+            <a:r>
+              <a:rPr lang="en-DE" sz="1200" dirty="0"/>
+              <a:t>Wars✅</a:t>
+            </a:r>
+          </a:p>
+          <a:p>
+            <a:pPr marL="285750" indent="-285750">
+              <a:buFont typeface="Arial" panose="020B0604020202020204" pitchFamily="34" charset="0"/>
+              <a:buChar char="•"/>
+            </a:pPr>
+            <a:r>
+              <a:rPr lang="en-DE" sz="1200" dirty="0"/>
+              <a:t>Battles✅</a:t>
+            </a:r>
+          </a:p>
+          <a:p>
+            <a:pPr marL="285750" indent="-285750">
+              <a:buFont typeface="Arial" panose="020B0604020202020204" pitchFamily="34" charset="0"/>
+              <a:buChar char="•"/>
+            </a:pPr>
+            <a:r>
+              <a:rPr lang="en-DE" sz="1200" dirty="0"/>
+              <a:t>Legions</a:t>
+            </a:r>
+          </a:p>
+          <a:p>
+            <a:pPr marL="285750" indent="-285750">
+              <a:buFont typeface="Arial" panose="020B0604020202020204" pitchFamily="34" charset="0"/>
+              <a:buChar char="•"/>
+            </a:pPr>
+            <a:endParaRPr lang="en-DE" sz="1200" dirty="0"/>
+          </a:p>
+        </p:txBody>
+      </p:sp>
+      <p:sp>
+        <p:nvSpPr>
+          <p:cNvPr id="3" name="Textfeld 2">
+            <a:extLst>
+              <a:ext uri="{FF2B5EF4-FFF2-40B4-BE49-F238E27FC236}">
+                <a16:creationId xmlns:a16="http://schemas.microsoft.com/office/drawing/2014/main" id="{CC80A0C6-BDF0-91F8-7BBD-D94DD41DF6ED}"/>
+              </a:ext>
+            </a:extLst>
+          </p:cNvPr>
+          <p:cNvSpPr txBox="1"/>
+          <p:nvPr/>
+        </p:nvSpPr>
+        <p:spPr>
+          <a:xfrm>
+            <a:off x="4352794" y="5264190"/>
+            <a:ext cx="1922746" cy="830997"/>
+          </a:xfrm>
+          <a:prstGeom prst="rect">
+            <a:avLst/>
+          </a:prstGeom>
+        </p:spPr>
+        <p:style>
+          <a:lnRef idx="1">
+            <a:schemeClr val="accent6"/>
+          </a:lnRef>
+          <a:fillRef idx="2">
+            <a:schemeClr val="accent6"/>
+          </a:fillRef>
+          <a:effectRef idx="1">
+            <a:schemeClr val="accent6"/>
+          </a:effectRef>
+          <a:fontRef idx="minor">
+            <a:schemeClr val="dk1"/>
+          </a:fontRef>
+        </p:style>
+        <p:txBody>
+          <a:bodyPr wrap="square" rtlCol="0">
+            <a:spAutoFit/>
+          </a:bodyPr>
+          <a:lstStyle/>
+          <a:p>
+            <a:pPr marL="285750" indent="-285750">
+              <a:buFont typeface="Arial" panose="020B0604020202020204" pitchFamily="34" charset="0"/>
+              <a:buChar char="•"/>
+            </a:pPr>
+            <a:r>
+              <a:rPr lang="en-US" sz="1200" dirty="0"/>
+              <a:t>G</a:t>
+            </a:r>
+            <a:r>
+              <a:rPr lang="en-DE" sz="1200" dirty="0" err="1"/>
+              <a:t>eography</a:t>
+            </a:r>
+            <a:r>
+              <a:rPr lang="en-DE" sz="1200" dirty="0"/>
+              <a:t> ✅</a:t>
+            </a:r>
+          </a:p>
+          <a:p>
+            <a:pPr marL="285750" indent="-285750">
+              <a:buFont typeface="Arial" panose="020B0604020202020204" pitchFamily="34" charset="0"/>
+              <a:buChar char="•"/>
+            </a:pPr>
+            <a:r>
+              <a:rPr lang="en-DE" sz="1200" dirty="0"/>
+              <a:t>Countries ✅</a:t>
+            </a:r>
+          </a:p>
+          <a:p>
+            <a:pPr marL="285750" indent="-285750">
+              <a:buFont typeface="Arial" panose="020B0604020202020204" pitchFamily="34" charset="0"/>
+              <a:buChar char="•"/>
+            </a:pPr>
+            <a:r>
+              <a:rPr lang="en-DE" sz="1200" dirty="0"/>
+              <a:t>Gov(</a:t>
+            </a:r>
+            <a:r>
+              <a:rPr lang="en-DE" sz="1200" dirty="0" err="1"/>
+              <a:t>ernment</a:t>
+            </a:r>
+            <a:r>
+              <a:rPr lang="en-DE" sz="1200" dirty="0"/>
+              <a:t>) ✅</a:t>
+            </a:r>
+          </a:p>
+          <a:p>
+            <a:pPr marL="285750" indent="-285750">
+              <a:buFont typeface="Arial" panose="020B0604020202020204" pitchFamily="34" charset="0"/>
+              <a:buChar char="•"/>
+            </a:pPr>
+            <a:r>
+              <a:rPr lang="en-DE" sz="1200" dirty="0"/>
+              <a:t>Cultures</a:t>
+            </a:r>
+          </a:p>
+        </p:txBody>
+      </p:sp>
+      <p:sp>
+        <p:nvSpPr>
+          <p:cNvPr id="4" name="Textfeld 3">
+            <a:extLst>
+              <a:ext uri="{FF2B5EF4-FFF2-40B4-BE49-F238E27FC236}">
+                <a16:creationId xmlns:a16="http://schemas.microsoft.com/office/drawing/2014/main" id="{FD730D0D-5751-D562-FACA-4DF4847AD8B6}"/>
+              </a:ext>
+            </a:extLst>
+          </p:cNvPr>
+          <p:cNvSpPr txBox="1"/>
+          <p:nvPr/>
+        </p:nvSpPr>
+        <p:spPr>
+          <a:xfrm>
+            <a:off x="239558" y="995819"/>
+            <a:ext cx="2141951" cy="830997"/>
+          </a:xfrm>
+          <a:prstGeom prst="rect">
+            <a:avLst/>
+          </a:prstGeom>
+        </p:spPr>
+        <p:style>
+          <a:lnRef idx="1">
+            <a:schemeClr val="dk1"/>
+          </a:lnRef>
+          <a:fillRef idx="2">
+            <a:schemeClr val="dk1"/>
+          </a:fillRef>
+          <a:effectRef idx="1">
+            <a:schemeClr val="dk1"/>
+          </a:effectRef>
+          <a:fontRef idx="minor">
+            <a:schemeClr val="dk1"/>
+          </a:fontRef>
+        </p:style>
+        <p:txBody>
+          <a:bodyPr wrap="square" rtlCol="0">
+            <a:spAutoFit/>
+          </a:bodyPr>
+          <a:lstStyle>
+            <a:defPPr>
+              <a:defRPr lang="en-DE"/>
+            </a:defPPr>
+            <a:lvl1pPr>
+              <a:defRPr sz="1200"/>
+            </a:lvl1pPr>
+          </a:lstStyle>
+          <a:p>
+            <a:r>
+              <a:rPr lang="en-US" dirty="0"/>
+              <a:t>A</a:t>
+            </a:r>
+            <a:r>
+              <a:rPr lang="en-DE" dirty="0" err="1"/>
+              <a:t>utosave</a:t>
+            </a:r>
+            <a:r>
+              <a:rPr lang="en-DE" dirty="0"/>
+              <a:t> watcher</a:t>
+            </a:r>
+          </a:p>
+          <a:p>
+            <a:pPr marL="171450" indent="-171450">
+              <a:buFont typeface="Arial" panose="020B0604020202020204" pitchFamily="34" charset="0"/>
+              <a:buChar char="•"/>
+            </a:pPr>
+            <a:r>
+              <a:rPr lang="en-US" dirty="0"/>
+              <a:t>B</a:t>
+            </a:r>
+            <a:r>
+              <a:rPr lang="en-DE" dirty="0" err="1"/>
+              <a:t>asic</a:t>
+            </a:r>
+            <a:r>
+              <a:rPr lang="en-DE" dirty="0"/>
+              <a:t> ✅</a:t>
+            </a:r>
+          </a:p>
+          <a:p>
+            <a:pPr marL="171450" indent="-171450">
+              <a:buFont typeface="Arial" panose="020B0604020202020204" pitchFamily="34" charset="0"/>
+              <a:buChar char="•"/>
+            </a:pPr>
+            <a:r>
+              <a:rPr lang="en-US" dirty="0"/>
+              <a:t>F</a:t>
+            </a:r>
+            <a:r>
+              <a:rPr lang="en-DE" dirty="0" err="1"/>
+              <a:t>unctions</a:t>
+            </a:r>
+            <a:endParaRPr lang="en-DE" dirty="0"/>
+          </a:p>
+          <a:p>
+            <a:pPr marL="171450" indent="-171450">
+              <a:buFont typeface="Arial" panose="020B0604020202020204" pitchFamily="34" charset="0"/>
+              <a:buChar char="•"/>
+            </a:pPr>
+            <a:r>
+              <a:rPr lang="en-US" dirty="0"/>
+              <a:t>L</a:t>
+            </a:r>
+            <a:r>
+              <a:rPr lang="en-DE" dirty="0"/>
+              <a:t>ink w/ game manager</a:t>
+            </a:r>
+          </a:p>
+        </p:txBody>
+      </p:sp>
+      <p:sp>
+        <p:nvSpPr>
+          <p:cNvPr id="10" name="Textfeld 9">
+            <a:extLst>
+              <a:ext uri="{FF2B5EF4-FFF2-40B4-BE49-F238E27FC236}">
+                <a16:creationId xmlns:a16="http://schemas.microsoft.com/office/drawing/2014/main" id="{C22E9FE7-45E7-40FA-536E-0F3A1208E301}"/>
+              </a:ext>
+            </a:extLst>
+          </p:cNvPr>
+          <p:cNvSpPr txBox="1"/>
+          <p:nvPr/>
+        </p:nvSpPr>
+        <p:spPr>
+          <a:xfrm>
+            <a:off x="239558" y="2039759"/>
+            <a:ext cx="2141951" cy="461665"/>
+          </a:xfrm>
+          <a:prstGeom prst="rect">
+            <a:avLst/>
+          </a:prstGeom>
+        </p:spPr>
+        <p:style>
+          <a:lnRef idx="1">
+            <a:schemeClr val="dk1"/>
+          </a:lnRef>
+          <a:fillRef idx="2">
+            <a:schemeClr val="dk1"/>
+          </a:fillRef>
+          <a:effectRef idx="1">
+            <a:schemeClr val="dk1"/>
+          </a:effectRef>
+          <a:fontRef idx="minor">
+            <a:schemeClr val="dk1"/>
+          </a:fontRef>
+        </p:style>
+        <p:txBody>
+          <a:bodyPr wrap="square" rtlCol="0">
+            <a:spAutoFit/>
+          </a:bodyPr>
+          <a:lstStyle>
+            <a:defPPr>
+              <a:defRPr lang="en-DE"/>
+            </a:defPPr>
+            <a:lvl1pPr>
+              <a:defRPr sz="1200"/>
+            </a:lvl1pPr>
+          </a:lstStyle>
+          <a:p>
+            <a:r>
+              <a:rPr lang="en-US" dirty="0"/>
+              <a:t>L</a:t>
+            </a:r>
+            <a:r>
+              <a:rPr lang="en-DE" dirty="0" err="1"/>
+              <a:t>oader</a:t>
+            </a:r>
+            <a:r>
+              <a:rPr lang="en-DE" dirty="0"/>
+              <a:t> </a:t>
+            </a:r>
+          </a:p>
+          <a:p>
+            <a:pPr marL="171450" indent="-171450">
+              <a:buFont typeface="Arial" panose="020B0604020202020204" pitchFamily="34" charset="0"/>
+              <a:buChar char="•"/>
+            </a:pPr>
+            <a:r>
+              <a:rPr lang="en-DE" dirty="0"/>
+              <a:t>to game manager</a:t>
+            </a:r>
+          </a:p>
+        </p:txBody>
+      </p:sp>
+      <p:sp>
+        <p:nvSpPr>
+          <p:cNvPr id="11" name="Textfeld 10">
+            <a:extLst>
+              <a:ext uri="{FF2B5EF4-FFF2-40B4-BE49-F238E27FC236}">
+                <a16:creationId xmlns:a16="http://schemas.microsoft.com/office/drawing/2014/main" id="{B978F6F9-A01E-D0C9-B2A4-C91384C337D5}"/>
+              </a:ext>
+            </a:extLst>
+          </p:cNvPr>
+          <p:cNvSpPr txBox="1"/>
+          <p:nvPr/>
+        </p:nvSpPr>
+        <p:spPr>
+          <a:xfrm>
+            <a:off x="239558" y="2570968"/>
+            <a:ext cx="2141951" cy="646331"/>
+          </a:xfrm>
+          <a:prstGeom prst="rect">
+            <a:avLst/>
+          </a:prstGeom>
+        </p:spPr>
+        <p:style>
+          <a:lnRef idx="1">
+            <a:schemeClr val="dk1"/>
+          </a:lnRef>
+          <a:fillRef idx="2">
+            <a:schemeClr val="dk1"/>
+          </a:fillRef>
+          <a:effectRef idx="1">
+            <a:schemeClr val="dk1"/>
+          </a:effectRef>
+          <a:fontRef idx="minor">
+            <a:schemeClr val="dk1"/>
+          </a:fontRef>
+        </p:style>
+        <p:txBody>
+          <a:bodyPr wrap="square" rtlCol="0">
+            <a:spAutoFit/>
+          </a:bodyPr>
+          <a:lstStyle/>
+          <a:p>
+            <a:r>
+              <a:rPr lang="en-US" sz="1200" dirty="0"/>
+              <a:t>S</a:t>
+            </a:r>
+            <a:r>
+              <a:rPr lang="en-DE" sz="1200" dirty="0"/>
+              <a:t>can &amp; list</a:t>
+            </a:r>
+          </a:p>
+          <a:p>
+            <a:pPr marL="285750" indent="-285750">
+              <a:buFont typeface="Arial" panose="020B0604020202020204" pitchFamily="34" charset="0"/>
+              <a:buChar char="•"/>
+            </a:pPr>
+            <a:r>
+              <a:rPr lang="en-US" sz="1200" dirty="0"/>
+              <a:t>J</a:t>
+            </a:r>
+            <a:r>
+              <a:rPr lang="en-DE" sz="1200" dirty="0"/>
+              <a:t>son</a:t>
+            </a:r>
+          </a:p>
+          <a:p>
+            <a:pPr marL="285750" indent="-285750">
+              <a:buFont typeface="Arial" panose="020B0604020202020204" pitchFamily="34" charset="0"/>
+              <a:buChar char="•"/>
+            </a:pPr>
+            <a:r>
+              <a:rPr lang="en-US" sz="1200" dirty="0"/>
+              <a:t>C</a:t>
+            </a:r>
+            <a:r>
+              <a:rPr lang="en-DE" sz="1200" dirty="0" err="1"/>
+              <a:t>sv</a:t>
+            </a:r>
+            <a:endParaRPr lang="en-DE" sz="1200" dirty="0"/>
+          </a:p>
+        </p:txBody>
+      </p:sp>
+      <p:sp>
+        <p:nvSpPr>
+          <p:cNvPr id="12" name="Rechteck 11">
+            <a:extLst>
+              <a:ext uri="{FF2B5EF4-FFF2-40B4-BE49-F238E27FC236}">
+                <a16:creationId xmlns:a16="http://schemas.microsoft.com/office/drawing/2014/main" id="{665EFA87-F796-3665-1627-F2B8F90AD2DB}"/>
+              </a:ext>
+            </a:extLst>
+          </p:cNvPr>
+          <p:cNvSpPr/>
+          <p:nvPr/>
+        </p:nvSpPr>
+        <p:spPr>
+          <a:xfrm>
+            <a:off x="8245258" y="3384972"/>
+            <a:ext cx="2160740" cy="2981195"/>
+          </a:xfrm>
+          <a:prstGeom prst="rect">
+            <a:avLst/>
+          </a:prstGeom>
+        </p:spPr>
+        <p:style>
+          <a:lnRef idx="2">
+            <a:schemeClr val="accent2">
+              <a:shade val="15000"/>
+            </a:schemeClr>
+          </a:lnRef>
+          <a:fillRef idx="1">
+            <a:schemeClr val="accent2"/>
+          </a:fillRef>
+          <a:effectRef idx="0">
+            <a:schemeClr val="accent2"/>
+          </a:effectRef>
+          <a:fontRef idx="minor">
+            <a:schemeClr val="lt1"/>
+          </a:fontRef>
+        </p:style>
+        <p:txBody>
+          <a:bodyPr rtlCol="0" anchor="t"/>
+          <a:lstStyle/>
+          <a:p>
+            <a:r>
+              <a:rPr lang="en-DE" dirty="0"/>
+              <a:t>Display</a:t>
+            </a:r>
+          </a:p>
+        </p:txBody>
+      </p:sp>
+      <p:sp>
+        <p:nvSpPr>
+          <p:cNvPr id="13" name="Rechteck 12">
+            <a:extLst>
+              <a:ext uri="{FF2B5EF4-FFF2-40B4-BE49-F238E27FC236}">
+                <a16:creationId xmlns:a16="http://schemas.microsoft.com/office/drawing/2014/main" id="{2B568B88-46AD-597C-FD48-C0FC59A17D4C}"/>
+              </a:ext>
+            </a:extLst>
+          </p:cNvPr>
+          <p:cNvSpPr/>
+          <p:nvPr/>
+        </p:nvSpPr>
+        <p:spPr>
+          <a:xfrm>
+            <a:off x="8245258" y="93760"/>
+            <a:ext cx="2160740" cy="3123538"/>
+          </a:xfrm>
+          <a:prstGeom prst="rect">
+            <a:avLst/>
+          </a:prstGeom>
+        </p:spPr>
+        <p:style>
+          <a:lnRef idx="2">
+            <a:schemeClr val="accent4">
+              <a:shade val="15000"/>
+            </a:schemeClr>
+          </a:lnRef>
+          <a:fillRef idx="1">
+            <a:schemeClr val="accent4"/>
+          </a:fillRef>
+          <a:effectRef idx="0">
+            <a:schemeClr val="accent4"/>
+          </a:effectRef>
+          <a:fontRef idx="minor">
+            <a:schemeClr val="lt1"/>
+          </a:fontRef>
+        </p:style>
+        <p:txBody>
+          <a:bodyPr rtlCol="0" anchor="t"/>
+          <a:lstStyle/>
+          <a:p>
+            <a:r>
+              <a:rPr lang="en-DE" dirty="0"/>
+              <a:t>Analyse &amp; visualize</a:t>
+            </a:r>
+          </a:p>
+        </p:txBody>
+      </p:sp>
+      <p:sp>
+        <p:nvSpPr>
+          <p:cNvPr id="14" name="Textfeld 13">
+            <a:extLst>
+              <a:ext uri="{FF2B5EF4-FFF2-40B4-BE49-F238E27FC236}">
+                <a16:creationId xmlns:a16="http://schemas.microsoft.com/office/drawing/2014/main" id="{A990C5A6-EBF3-BFEB-BCD6-383F26F1C0AE}"/>
+              </a:ext>
+            </a:extLst>
+          </p:cNvPr>
+          <p:cNvSpPr txBox="1"/>
+          <p:nvPr/>
+        </p:nvSpPr>
+        <p:spPr>
+          <a:xfrm>
+            <a:off x="231730" y="3615469"/>
+            <a:ext cx="2141951" cy="1200329"/>
+          </a:xfrm>
+          <a:prstGeom prst="rect">
+            <a:avLst/>
+          </a:prstGeom>
+        </p:spPr>
+        <p:style>
+          <a:lnRef idx="1">
+            <a:schemeClr val="dk1"/>
+          </a:lnRef>
+          <a:fillRef idx="2">
+            <a:schemeClr val="dk1"/>
+          </a:fillRef>
+          <a:effectRef idx="1">
+            <a:schemeClr val="dk1"/>
+          </a:effectRef>
+          <a:fontRef idx="minor">
+            <a:schemeClr val="dk1"/>
+          </a:fontRef>
+        </p:style>
+        <p:txBody>
+          <a:bodyPr wrap="square" rtlCol="0">
+            <a:spAutoFit/>
+          </a:bodyPr>
+          <a:lstStyle/>
+          <a:p>
+            <a:r>
+              <a:rPr lang="en-US" sz="1200" dirty="0"/>
+              <a:t>S</a:t>
+            </a:r>
+            <a:r>
+              <a:rPr lang="en-DE" sz="1200" dirty="0"/>
+              <a:t>tore &amp; manage</a:t>
+            </a:r>
+          </a:p>
+          <a:p>
+            <a:pPr marL="171450" indent="-171450">
+              <a:buFont typeface="Arial" panose="020B0604020202020204" pitchFamily="34" charset="0"/>
+              <a:buChar char="•"/>
+            </a:pPr>
+            <a:r>
+              <a:rPr lang="en-US" sz="1200" dirty="0"/>
+              <a:t>C</a:t>
+            </a:r>
+            <a:r>
+              <a:rPr lang="en-DE" sz="1200" dirty="0" err="1"/>
+              <a:t>urrent</a:t>
+            </a:r>
+            <a:r>
+              <a:rPr lang="en-DE" sz="1200" dirty="0"/>
+              <a:t> &amp; past games</a:t>
+            </a:r>
+          </a:p>
+          <a:p>
+            <a:pPr marL="171450" indent="-171450">
+              <a:buFont typeface="Arial" panose="020B0604020202020204" pitchFamily="34" charset="0"/>
+              <a:buChar char="•"/>
+            </a:pPr>
+            <a:r>
+              <a:rPr lang="en-US" sz="1200" dirty="0"/>
+              <a:t>T</a:t>
+            </a:r>
+            <a:r>
+              <a:rPr lang="en-DE" sz="1200" dirty="0"/>
+              <a:t>emp data (melt, </a:t>
+            </a:r>
+            <a:r>
+              <a:rPr lang="en-DE" sz="1200" dirty="0" err="1"/>
+              <a:t>json</a:t>
+            </a:r>
+            <a:r>
+              <a:rPr lang="en-DE" sz="1200" dirty="0"/>
+              <a:t>)</a:t>
+            </a:r>
+          </a:p>
+          <a:p>
+            <a:pPr marL="171450" indent="-171450">
+              <a:buFont typeface="Arial" panose="020B0604020202020204" pitchFamily="34" charset="0"/>
+              <a:buChar char="•"/>
+            </a:pPr>
+            <a:r>
+              <a:rPr lang="en-US" sz="1200" dirty="0"/>
+              <a:t>E</a:t>
+            </a:r>
+            <a:r>
+              <a:rPr lang="en-DE" sz="1200" dirty="0" err="1"/>
+              <a:t>xcel</a:t>
+            </a:r>
+            <a:r>
+              <a:rPr lang="en-DE" sz="1200" dirty="0"/>
+              <a:t> ✅</a:t>
+            </a:r>
+          </a:p>
+          <a:p>
+            <a:pPr marL="171450" indent="-171450">
+              <a:buFont typeface="Arial" panose="020B0604020202020204" pitchFamily="34" charset="0"/>
+              <a:buChar char="•"/>
+            </a:pPr>
+            <a:endParaRPr lang="en-DE" sz="1200" dirty="0"/>
+          </a:p>
+          <a:p>
+            <a:pPr marL="171450" indent="-171450">
+              <a:buFont typeface="Arial" panose="020B0604020202020204" pitchFamily="34" charset="0"/>
+              <a:buChar char="•"/>
+            </a:pPr>
+            <a:endParaRPr lang="en-DE" sz="1200" dirty="0"/>
+          </a:p>
+        </p:txBody>
+      </p:sp>
+      <p:sp>
+        <p:nvSpPr>
+          <p:cNvPr id="15" name="Textfeld 14">
+            <a:extLst>
+              <a:ext uri="{FF2B5EF4-FFF2-40B4-BE49-F238E27FC236}">
+                <a16:creationId xmlns:a16="http://schemas.microsoft.com/office/drawing/2014/main" id="{086BDDAE-4FB2-9D7E-365A-EE3B7F381075}"/>
+              </a:ext>
+            </a:extLst>
+          </p:cNvPr>
+          <p:cNvSpPr txBox="1"/>
+          <p:nvPr/>
+        </p:nvSpPr>
+        <p:spPr>
+          <a:xfrm>
+            <a:off x="4352794" y="4320986"/>
+            <a:ext cx="1459282" cy="276999"/>
+          </a:xfrm>
+          <a:prstGeom prst="rect">
+            <a:avLst/>
+          </a:prstGeom>
+        </p:spPr>
+        <p:style>
+          <a:lnRef idx="1">
+            <a:schemeClr val="accent6"/>
+          </a:lnRef>
+          <a:fillRef idx="2">
+            <a:schemeClr val="accent6"/>
+          </a:fillRef>
+          <a:effectRef idx="1">
+            <a:schemeClr val="accent6"/>
+          </a:effectRef>
+          <a:fontRef idx="minor">
+            <a:schemeClr val="dk1"/>
+          </a:fontRef>
+        </p:style>
+        <p:txBody>
+          <a:bodyPr wrap="square" rtlCol="0">
+            <a:spAutoFit/>
+          </a:bodyPr>
+          <a:lstStyle/>
+          <a:p>
+            <a:pPr marL="285750" indent="-285750">
+              <a:buFont typeface="Arial" panose="020B0604020202020204" pitchFamily="34" charset="0"/>
+              <a:buChar char="•"/>
+            </a:pPr>
+            <a:r>
+              <a:rPr lang="en-US" sz="1200" dirty="0"/>
+              <a:t>V</a:t>
+            </a:r>
+            <a:r>
+              <a:rPr lang="en-DE" sz="1200" dirty="0" err="1"/>
+              <a:t>ar</a:t>
+            </a:r>
+            <a:r>
+              <a:rPr lang="en-DE" sz="1200" dirty="0"/>
+              <a:t> names</a:t>
+            </a:r>
+          </a:p>
+        </p:txBody>
+      </p:sp>
+    </p:spTree>
+    <p:extLst>
+      <p:ext uri="{BB962C8B-B14F-4D97-AF65-F5344CB8AC3E}">
+        <p14:creationId xmlns:p14="http://schemas.microsoft.com/office/powerpoint/2010/main" val="3396881929"/>
+      </p:ext>
+    </p:extLst>
+  </p:cSld>
+  <p:clrMapOvr>
+    <a:masterClrMapping/>
+  </p:clrMapOvr>
+</p:sld>
+</file>
+
 <file path=ppt/tags/tag1.xml><?xml version="1.0" encoding="utf-8"?>
 <p:tagLst xmlns:a="http://schemas.openxmlformats.org/drawingml/2006/main" xmlns:r="http://schemas.openxmlformats.org/officeDocument/2006/relationships" xmlns:p="http://schemas.openxmlformats.org/presentationml/2006/main">
   <p:tag name="EMPOWERCHARTSPROPERTIES_B_0" val="AAAAAAH//////////wEAAAAAAAAAAAAAACoqIFRoaXMgaXMgYSBMaXRlREIgZmlsZSAqKgcEAP////8FAAAAAQAAAAAAAAAAAAAAAAAAAAAAAAAAAAAAAAAAAAAAAAAAAAAAAAABEQAAAFByb3BlcnR5RG9jdW1lbnRzAgAAAAAAAAAAAAAAAAAAAAAAAAAAAAAAAAAAAAAAAAAAAAAAAAAAAAAAAAAAAAAAAAAAAAAAAAAAAAAAAAAAAAAAAAAAAAAAAAAAAAAAAAAAAAAAAAAAAAAAAAAAAAAAAAAAAAAAAAAAAAAAAAAAAAAAAAAAAAAAAAAAAAAAAAAAAAAAAAAAAAAAAAAAAAAAAAAAAAAAAAAAAAAAAAAAAAAAAAAAAAAAAAAAAAAAAAAAAAAAAAAAAAAAAAAAAAAAAAAAAAAAAAAAAAAAAAAAAAAAAAAAAAAAAAAAAAAAAAAAAAAAAAAAAAAAAAAAAAAAAAAAAAAAAAAAAAAAAAAAAAAAAAAAAAAAAAAAAAAAAAAAAAAAAAAAAAAAAAAAAAAAAAAAAAAAAAAAAAAAAAAAAAAAAAAAAAAAAAAAAAAAAAAAAAAAAAAAAAAAAAAAAAAAAAAAAAAAAAAAAAAAAAAAAAAAAAAAAAAAAAAAAAAAAAAAAAAAAAAAAAAAAAAAAAAAAAAAAAAAAAAAAAAAAAAAAAAAAAAAAAAAAAAAAAAAAAAAAAAAAAAAAAAAAAAAAAAAAAAAAAAAAAAAAAAAAAAAAAAAAAAAAAAAAAAAAAAAAAAAAAAAAAAAAAAAAAAAAAAAAAAAAAAAAAAAAAAAAAAAAAAAAAAAAAAAAAAAAAAAAAAAAAAAAAAAAAAAAAAAAAAAAAAAAAAAAAAAAAAAAAAAAAAAAAAAAAAAAAAAAAAAAAAAAAAAAAAAAAAAAAAAAAAAAAAAAAAAAAAAAAAAAAAAAAAAAAAAAAAAAAAAAAAAAAAAAAAAAAAAAAAAAAAAAAAAAAAAAAAAAAAAAAAAAAAAAAAAAAAAAAAAAAAAAAAAAAAAAAAAAAAAAAAAAAAAAAAAAAAAAAAAAAAAAAAAAAAAAAAAAAAAAAAAAAAAAAAAAAAAAAAAAAAAAAAAAAAAAAAAAAAAAAAAAAAAAAAAAAAAAAAAAAAAAAAAAAAAAAAAAAAAAAAAAAAAAAAAAAAAAAAAAAAAAAAAAAAAAAAAAAAAAAAAAAAAAAAAAAAAAAAAAAAAAAAAAAAAAAAAAAAAAAAAAAAAAAAAAAAAAAAAAAAAAAAAAAAAAAAAAAAAAAAAAAAAAAAAAAAAAAAAAAAAAAAAAAAAAAAAAAAAAAAAAAAAAAAAAAAAAAAAAAAAAAAAAAAAAAAAAAAAAAAAAAAAAAAAAAAAAAAAAAAAAAAAAAAAAAAAAAAAAAAAAAAAAAAAAAAAAAAAAAAAAAAAAAAAAAAAAAAAAAAAAAAAAAAAAAAAAAAAAAAAAAAAAAAAAAAAAAAAAAAAAAAAAAAAAAAAAAAAAAAAAAAAAAAAAAAAAAAAAAAAAAAAAAAAAAAAAAAAAAAAAAAAAAAAAAAAAAAAAAAAAAAAAAAAAAAAAAAAAAAAAAAAAAAAAAAAAAAAAAAAAAAAAAAAAAAAAAAAAAAAAAAAAAAAAAAAAAAAAAAAAAAAAAAAAAAAAAAAAAAAAAAAAAAAAAAAAAAAAAAAAAAAAAAAAAAAAAAAAAAAAAAAAAAAAAAAAAAAAAAAAAAAAAAAAAAAAAAAAAAAAAAAAAAAAAAAAAAAAAAAAAAAAAAAAAAAAAAAAAAAAAAAAAAAAAAAAAAAAAAAAAAAAAAAAAAAAAAAAAAAAAAAAAAAAAAAAAAAAAAAAAAAAAAAAAAAAAAAAAAAAAAAAAAAAAAAAAAAAAAAAAAAAAAAAAAAAAAAAAAAAAAAAAAAAAAAAAAAAAAAAAAAAAAAAAAAAAAAAAAAAAAAAAAAAAAAAAAAAAAAAAAAAAAAAAAAAAAAAAAAAAAAAAAAAAAAAAAAAAAAAAAAAAAAAAAAAAAAAAAAAAAAAAAAAAAAAAAAAAAAAAAAAAAAAAAAAAAAAAAAAAAAAAAAAAAAAAAAAAAAAAAAAAAAAAAAAAAAAAAAAAAAAAAAAAAAAAAAAAAAAAAAAAAAAAAAAAAAAAAAAAAAAAAAAAAAAAAAAAAAAAAAAAAAAAAAAAAAAAAAAAAAAAAAAAAAAAAAAAAAAAAAAAAAAAAAAAAAAAAAAAAAAAAAAAAAAAAAAAAAAAAAAAAAAAAAAAAAAAAAAAAAAAAAAAAAAAAAAAAAAAAAAAAAAAAAAAAAAAAAAAAAAAAAAAAAAAAAAAAAAAAAAAAAAAAAAAAAAAAAAAAAAAAAAAAAAAAAAAAAAAAAAAAAAAAAAAAAAAAAAAAAAAAAAAAAAAAAAAAAAAAAAAAAAAAAAAAAAAAAAAAAAAAAAAAAAAAAAAAAAAAAAAAAAAAAAAAAAAAAAAAAAAAAAAAAAAAAAAAAAAAAAAAAAAAAAAAAAAAAAAAAAAAAAAAAAAAAAAAAAAAAAAAAAAAAAAAAAAAAAAAAAAAAAAAAAAAAAAAAAAAAAAAAAAAAAAAAAAAAAAAAAAAAAAAAAAAAAAAAAAAAAAAAAAAAAAAAAAAAAAAAAAAAAAAAAAAAAAAAAAAAAAAAAAAAAAAAAAAAAAAAAAAAAAAAAAAAAAAAAAAAAAAAAAAAAAAAAAAAAAAAAAAAAAAAAAAAAAAAAAAAAAAAAAAAAAAAAAAAAAAAAAAAAAAAAAAAAAAAAAAAAAAAAAAAAAAAAAAAAAAAAAAAAAAAAAAAAAAAAAAAAAAAAAAAAAAAAAAAAAAAAAAAAAAAAAAAAAAAAAAAAAAAAAAAAAAAAAAAAAAAAAAAAAAAAAAAAAAAAAAAAAAAAAAAAAAAAAAAAAAAAAAAAAAAAAAAAAAAAAAAAAAAAAAAAAAAAAAAAAAAAAAAAAAAAAAAAAAAAAAAAAAAAAAAAAAAAAAAAAAAAAAAAAAAAAAAAAAAAAAAAAAAAAAAAAAAAAAAAAAAAAAAAAAAAAAAAAAAAAAAAAAAAAAAAAAAAAAAAAAAAAAAAAAAAAAAAAAAAAAAAAAAAAAAAAAAAAAAAAAAAAAAAAAAAAAAAAAAAAAAAAAAAAAAAAAAAAAAAAAAAAAAAAAAAAAAAAAAAAAAAAAAAAAAAAAAAAAAAAAAAAAAAAAAAAAAAAAAAAAAAAAAAAAAAAAAAAAAAAAAAAAAAAAAAAAAAAAAAAAAAAAAAAAAAAAAAAAAAAAAAAAAAAAAAAAAAAAAAAAAAAAAAAAAAAAAAAAAAAAAAAAAAAAAAAAAAAAAAAAAAAAAAAAAAAAAAAAAAAAAAAAAAAAAAAAAAAAAAAAAAAAAAAAAAAAAAAAAAAAAAAAAAAAAAAAAAAAAAAAAAAAAAAAAAAAAAAAAAAAAAAAAAAAAAAAAAAAAAAAAAAAAAAAAAAAAAAAAAAAAAAAAAAAAAAAAAAAAAAAAAAAAAAAAAAAAAAAAAAAAAAAAAAAAAAAAAAAAAAAAAAAAAAAAAAAAAAAAAAAAAAAAAAAAAAAAAAAAAAAAAAAAAAAAAAAAAAAAAAAAAAAAAAAAAAAAAAAAAAAAAAAAAAAAAAAAAAAAAAAAAAAAAAAAAAAAAAAAAAAAAAAAAAAAAAAAAAAAAAAAAAAAAAAAAAAAAAAAAAAAAAAAAAAAAAAAAAAAAAAAAAAAAAAAAAAAAAAAAAAAAAAAAAAAAAAAAAAAAAAAAAAAAAAAAAAAAAAAAAAAAAAAAAAAAAAAAAAAAAAAAAAAAAAAAAAAAAAAAAAAAAAAAAAAAAAAAAAAAAAAAAAAAAAAAAAAAAAAAAAAAAAAAAAAAAAAAAAAAAAAAAAAAAAAAAAAAAAAAAAAAAAAAAAAAAAAAAAAAAAAAAAAAAAAAAAAAAAAAAAAAAAAAAAAAAAAAAAAAAAAAAAAAAAAAAAAAAAAAAAAAAAAAAAAAAAAAAAAAAAAAAAAAAAAAAAAAAAAAAAAAAAAAAAAAAAAAAAAAAAAAAAAAAAAAAAAAAAAAAAAAAAAAAAAAAAAAAAAAAAAAAAAAAAAAAAAAAAAAAAAAAAAAAAAAAAAAAAAAAAAAAAAAAAAAAAAAAAAAAAAAAAAAAAAAAAAAAAAAAAAAAAAAAAAAAAAAAAAAAAAAAAAAAAAAAAAAAAAAAAAAAAAAAAAAAAAAAAAAAAAAAAAAAAAAAAAAAAAAAAAAAAAAAAAAAAAAAAAAAAAAAAAAAAAAAAAAAAAAAAAAAAAAAAAAAAAAAAAAAAAAAAAAAAAAAAAAAAAAAAAAAAAAAAAAAAAAAAAAAAAAAAAAAAAAAAAAAAAAAAAAAAAAAAAAAAAAAAAAAAAAAAAAAAAAAAAAAAAAAAAAAAAAAAAAAAAAAAAAAAAAAAAAAAAAAAAAAAAAAAAAAAAAAAAAAAAAAAAAAAAAAAAAAAAAAAAAAAAAAAAAAAAAAAAAAAAAAAAAAAAAAAAAAAAAAAAAAAAAAAAAAAAAAAAAAAAAAAAAAAAAAAAAAAAAAAAAAAAAAAAAAAAAAAAAAAAAAAAAAAAAAAAAAAAAAAAAAAAAAAAAAAAAAAAAAAAAAAAAAAAAAAAAAAAAAAAAAAAAAAAAAAAAAAAAAAAAAAAAAAAAAAAAAAAAAAAAAAAAAAAAAAAAAAAAAAAAAAAAAAAAAAAAAAAAAAAAAAAAAAAAAAAAAAAAAAAAAAAAAAAAAAAAAAAAAAAAAAAAAAAAAAAAAAAAAAAAAAAAAAAAAAAAAAAAAAAAAAAAAAAAAAAAAAAAAAAAAAAAAAAAAAAAAAAAAAAAAAAAAAAAAAAAAAAAAAAAAAAAAAAAAAAAAAAAAAAAAAAAAAAAAAAAAAAAAAAAAAAAAAAAAAAAAAAAAAAAAAAAAAAAAAAAAAAAAAAAAAAAAAAAAAAAAAAAAAAAAAAAAAAAAAAAAAAAAAAAAAAAAAAAAAAAAAAAAAAAAAAAAAAAAAAAAAAAAAAAAAAAAAAAAAAAAAAAAAAAAAAAAAAAAAAAAAAAAAAAAAAAAAAAAAAAAAAAAAAAAAAAAAAAAAAAAAAAAAAAAAAAAAAAAAAAAAAAAAAAAAAAAAAAAAAAAAAAAAAAAAAAAAAAAAAAAAAAAAAAAAAAAAAAAAAAAAAAAAAAAAAAAAAAAAAAAAAAAAAAAAAAAAAAAAAAAAAAAAAAAAAAAAAAAAAAAAAAAAAAAAAAAAAAAAAAAAAAAAAAAAAAAAAAAAAAAAAAAAAAAAAAAAAAAAAAAAAAAAAAAAAAAAAAAAAAAAAAAAAAAAAAAAAAAAAAAAAAAAAAAAAAAAAAAAAAAAAAAAAAAAAAAAAAAAAAAAAAAAAAAAAAAAAAAAAAAAAAAAAAAAAAAAAAAAAAAAAAAAAAAAAAAAAAAAAAAAAAAAAAAAAAAAAAAAAAAAAAAAAAAAAAAAAAAAAAAAAAAAAAAAAAAAAAAAAAAAAAAAAAAAAAAAAAAAAAAAAAAAAAAAAAAAAAAAAAAAAAAAAAAAAAAAAAAAAAAAAAAAAAAAAAAAAAAAAAAAAAAAAAAAAAAAAAAAAAAAAAAAAAAAAAAAAAAAAAAAAAAAAAAAAAAAAAAAAAAAAAAAAAAAAAAAAAAAAAAAAAAAAAAAAAAAAAAAAAAAAAAAAAAAAAAAAAAAAAAAAAAAAAAAAAAAAAAAAAAAAAAAAAAAAAAAAAAAAAAAAAAAAAAAAAAAAAAAAAAAAAAAAAAAAAAAAAAAAAAAAAAAAAAAAAAAAAAAAAAAAAAAAAAAAAAAAAAAAAAAAAAAAAAAAAAAAAAAAAAAAAAAAAAAAAAAAAAAAAAAAAAAAAAAAAAAAAAAAAAAAAAAAAAAAAAAAAAAAAAAAAAAAAAAAAAAAAAAAAAAAAAAAAAAAAAAAAAAAAAAAAAAAAAAAAAAAAAAAAAAAAAAAAAAAAAAAAAAAAAAAAAAAAAAAAAAAAAAAAAAAAAAAAAAAAAAAAAAAAAAAAAAAAAAAAAAAAAAAAAAAAAAAAAAAAAAAAAAAAAAAAAAAAAAAAAAAAAAAAAAAAAAAAAAAAAAAAAAAAAAAAAAAAAAAAAAAAAAAAAAAAAAAAAAAAAAAAAAAAAAAAAAAAAAAAAAAAAAAAAAAAAAAAAAAAAAAAAAAAAAAAAAAAAAAAAAAAAAAAAAAAAAAAAAAAAAAAAAAAAAAAAAAAAAAAAAAAAAAAAAAAAAAAAAAAAAAAAAAAAAAAAAAAAAAAAAAAAAAAAAAAAAAAAAAAAAAAAAAAAAAAAAAAAAAAAAAAAAAAAAAAAAAAAAAAAAAAAAAAAAAAAAAAAAAAAAAAAAAAAAAAAAAAAAAAAAAAAAAAAAAAAAAAAAAAAAAAAAAAAAAAAAAAAAAAAAAAAAAAAAAAAAAAAAAAAAAAAAAAAAAAAAAAAAAAAAAAAAAAAAAAAAAAAAAAAAAAAAAAAAAAAAAAAAAAAAAAAAAAAAAAAAAAAAAAAAAAAAAAAAAAAAAAAAAAAAAAAAAAAAAAAAAAAAAAAAAAAAAAAAAAAAAAAAAAAAAAAAAAAAAAAAAAAAAAAAAAAAAAAAAAAAAAAAAAAAAAAAAAAAAAAAAAAAAAAAAAAAAAAAAAAAAAAAAAAAAAAAAAAAAAAAAAAAAAAAAAAAAAAAAAAAAAAAAAAAAAAAAAAAAAAAAAAAAAAAAAAAAAAAAAAAAAAAAAAAAAAAAAAAAAAAAAAAAAAAAAAAAAAAAAAAAAAAAAAAAAAAAAAAAAAAAAAAAAAAAAAAAAAAAAAAAAAAAAAAAAAAAAAAAAAAAAAAAAAAAAAAAAAAAAAAAAAAAAAAAAAAAAAAAAAAAAAAAAAAAAAAAAAAAAAAAAAAAAAAAAAAAAAAAAAAAAAAAAAAAAAAAAAAAAAAAAAAAAAAAAAAAAAAAAAAAAAAAAAAAAAAAAAAAAAAAAAAAAAAAAAAAAAAAAAAAAAAAAAAAAAAAAAAAAAAAAAAAAAAAAAAAAAAAAAAAAAAAAAAAAAAAAAAAAAAAAAAAAAAAAAAAAAAAAAAAAAAAAAAAAAAAAAAAAAAAAAAAAAAAAAAAAAAAAAAAAAAAAAAAAAAAAAAAAAAAAAAAAAAAAAAAAAAAAAAAAAAAAAAAAAAAAAAAAAAAAAAAAAAAAAAAAAAAAAAAAAAAAAAAAAAAAAAAAAAAAAAAAAAAAAAAAAAAAAAAAAAAAAAAAAAAAAAAAAAAAAAAAAAAAAAAAAAAAAAAAAAAAAAAAAAAAAAAAAAAAAAAAAAAAAAAAAAAAAAAAAAAAAAAAAAAAAAAAAAAAAAAAAAAAAAAAAAAAAAAAAAAAAAAAAAAAAAAAAAAAAAAAAAAAAAAAAAAAAAAAAAAAAAAAAAAAAAAAAAAAAAAAAAAAAAAAAAAAAAAAAAAAAAAAAAAAAAAAAAAAAAAAAAAAAAAAAAAAAAAAAAAAAAAAAAAAAAAAAAAAAAAAAAAAAAAAAAAAAAAAAAAAAAAAAAAAAAAAAAAAAAAAAAAAAAAAAAAAAAAAAAAAAAAAAAAAAAAAAAAAAAAAAAAAAAAAAAAAAAAAAAAAAAAAAAAAAAAAAAAAAAAAAAAAAAAAAAAAAAAAAAAAAAAAAAAAAAAAAAAAAAAAAAAAAAAAAAAAAAAAAAAAAAAAAAAAAAAAAAAAAAAAAAAAAAAAAAAAAAAAAAAAAAAAAAAAAAAAAAAAAAAAAAAAAAAAAAAAAAAAAAAAAAAAAAAAAAAAAAAAAAAAAAAAAAAAAAAAAAAAAAAAAAAAAAAAAAAAAAAAAAAAAAAAAAAAAAAAAAAAAAAAAAAAAAAAAAAAAAAAAAAAAAAAAAAAAAAAAAAAAAAAAAAAAAAAAAAAAAAAAAAAAAAAAAAAAAAAAAAAAAAAAAAAAAAAAAAAAAAAAAAAAAAAAAAAAAAAAAAAAAAAAAAAAAAAAAAAAAAAAAAAAAAAAAAAAAAAAAAAAAAAAAAAAAAAAAAAAAAAAAAAAAAAAAAAAAAAAAAAAAAAAAAAAAAAAAAAAAAAAAAAAAAAAAAAAAAAAAAAAAAAAAAAAAAAAAAAAAAAAAAAAAAAAAAAAAAAAAAAAAAAAAAAAAAAAAAAAAAAAAAAAAAAAAAAAAAAAAAAAAAAAAAAAAAAAAAAAAAAAAAAAAAAAAAAAAAAAAAAAAAAAAAAAAAAAAAAAAAAAAAAAAAAAAAAAAAAAAAAAAAAAAAAAAAAAAAAAAAAAAAAAAAAAAAAAAAAAAAAAAAAAAAAAAAAAAAAAAAAAAAAAAAAAAAAAAAAAAAAAAAAAAAAAAAAAAAAAAAAAAAAAAAAAAAAAAAAAAAAAAAAAAAAAAAAAAAAAAAAAAAAAAAAAAAAAAAAAAAAAAAAAAAAAAAAAAAAAAAAAAAAAAAAAAAAAAAAAAAAAAAAAAAAAAAAAAAAAAAAAAAAAAAAAAAAAAAAAAAAAAAAAAAAAAAAAAAAAAAAAAAAAAAAAAAAAAAAAAAAAAAAAAAAAAAAAAAAAAAAAAAAAAAAAAAAAAAAAAAAAAAAAAAAAAAAAAAAAAAAAAAAAAAAAAAAAAAAAAAAAAAAAAAAAAAAAAAAAAAAAAAAAAAAAAAAAAAAAAAAAAAAAAAAAAAAAAAAAAAAAAAAAAAAAAAAAAAAAAAAAAAAAAAAAAAAAAAAAAAAAAAAAAAAAAAAAAAAAAAAAAAAAAAAAAAAAAAAAAAAAAAAAAAAAAAAAAAAAAAAAAAAAAAAAAAAAAAAAAAAAAAAAAAAAAAAAAAAAAAAAAAAAAAAAAAAAAAAAAAAAAAAAAAAAAAAAAAAAAAAAAAAAAAAAAAAAAAAAAAAAAAAAAAAAAAAAAAAAAAAAAAAAAAAAAAAAAAAAAAAAAAAAAAAAAAAAAAAAAAAAAAAAAAAAAAAAAAAAAAAAAAAAAAAAAAAAAAAAAAAAAAAAAAAAAAAAAAAAAAAAAAAAAAAAAAAAAAAAAAAAAAAAAAAAAAAAAAAAAAAAAAAAAAAAAAAAAAAAAAAAAAAAAAAAAAAAAAAAAAAAAAAAAAAAAAAAAAAAAAAAAAAAAAAAAAAAAAAAAAAAAAAAAAAAAAAAAAAAAAAAAAAAAAAAAAAAAAAAAAAAAAAAAAAAAAAAAAAAAAAAAAAAAAAAAAAAAAAAAAAAAAAAAAAAAAAAAAAAAAAAAAAAAAAAAAAAAAAAAAAAAAAAAAAAAAAAAAAAAAAAAAAAAAAAAAAAAAAAAAAAAAAAAAAAAAAAAAAAAAAAAAAAAAAAAAAAAAAAAAAAAAAAAAAAAAAAAAAAAAAAAAAAAAAAAAAAAAAAAAAAAAAAAAAAAAAAAAAAAAAAAAAAAAAAAAAAAAAAAAAAAAAAAAAAAAAAAAAAAAAAAAAAAAAAAAAAAAAAAAAAAAAAAAAAAAAAAAAAAAAAAAAAAAAAAAAAAAAAAAAAAAAAAAAAAAAAAAAAAAAAAAAAAAAAAAAAAAAAAAAAAAAAAAAAAAAAAAAAAAAAAAAAAAAAAAAAAAAAAAAAAAAAAAAAAAAAAAAAAAAAAAAAAAAAAAAAAAAAAAAAAAAAAAAAAAAAAAAAAAAAAAAAAAAAAAAAAAAAAAAAAAAAAAAAAAAAAAAAAAAAAAAAAAAAAAAAAAAAAAAAAAAAAAAAAAAAAAAAAAAAAAAAAAAAAAAAAAAAAAAAAAAAAAAAAAAAAAAAAAAAAAAAAAAAAAAAAAAAAAAAAAAAAAAAAAAAAAAAAAAAAAAAAAAAAAAAAAAAAAAAAAAAAAAAAAAAAAAAAAAAAAAAAAAAAAAAAAAAAAAAAAAAAAAAAAAAAAAAAAAAAAAAAAAAAAAAAAAAAAAAAAAAAAAAAAAAAAAAAAAAAAAAAAAAAAAAAAAAAAAAAAAAAAAAAAAAAAAAAAAAAAAAAAAAAAAAAAAAAAAAAAAAAAAAAAAAAAAAAAAAAAAAAAAAAAAAAAAAAAAAAAAAAAAAAAAAAAAAAAAAAAAAAAAAAAAAAAAAAAAAAAAAAAAAAAAAAAAAAAAAAAAAAAAAAAAAAAAAAAAAAAAAAAAAAAAAAAAAAAAAAAAAAAAAAAAAAAAAAAAAAAAAAAAAAAAAAAAAAAAAAAAAAAAAAAAAAAAAAAAAAAAAAAAAAAAAAAAAAAAAAAAAAAAAAAAAAAAAAAAAAAAAAAAAAAAAAAAAAAAAAAAAAAAAAAAAAAAAAAAAAAAAAAAAAAAAAAAAAAAAAAAAAAAAAAAAAAAAAAAAAAAAAAAAAAAAAAAAAAAAAAAAAAAAAAAAAAAAAAAAAAAAAAAAAAAAAAAAAAAAAAAAAAAAAAAAAAAAAAAAAAAAAAAAAAAAAAAAAAAAAAAAAAAAAAAAAAAAAAAAAAAAAAAAAAAAAAAAAAAAAAAAAAAAAAAAAAAAAAAAAAAAAAAAAAAAAAAAAAAAAAAAAAAAAAAAAAAAAAAAAAAAAAAAAAAAAAAAAAAAAAAAAAAAAAAAAAAAAAAAAAAAAAAAAAAAAAAAAAAAAAAAAAAAAAAAAAAAAAAAAAAAAAAAAAAAAAAAAAAAAAAAAAAAAAAAAAAAAAAAAAAAAAAAAAAAAAAAAAAAAAAAAAAAAAAAAAAAAAAAAAAAAAAAAAAAAAAAAAAAAAAAAAAAAAAAAAAAAAAAAAAAAAAAAAAAAAAAAAAAAAAAAAAAAAAAAAAAAAAAAAAAAAAAAAAAAAAAAAAAAAAAAAAAAAAAAAAAAAAAAAAAAAAAAAAAAAAAAAAAAAAAAAAAAAAAAAAAAAAAAAAAAAAAAAAAAAAAAAAAAAAAAAAAAAAAAAAAAAAAAAAAAAAAAAAAAAAAAAAAAAAAAAAAAAAAAAAAAAAAAAAAAAAAAAAAAAAAAAAAAAAAAAAAAAAAAAAAAAAAAAAAAAAAAAAAAAAAAAAAAAAAAAAAAAAAAAAAAAAAAAAAAAAAAAAAACAAAAAv//////////AQAAAAAAAAAAAAAAEQAAAFByb3BlcnR5RG9jdW1lbnRzAgAAAAAAAAAFAAAACQAAAF9pZD0kLl9pZAEDAAAAAAADAAAAAQADAAAAIwAAAENvbWJpSW5kZXg9JC5OYW1lICsgJ18nICsgJC5WZXJzaW9uAQQAAAAAAAQAAAABAAQAAAAAAAAAAP///////wAAAAAAAP////8AAAAAAP///////wAAAAAAAP////8AAAAAAP///////wAAAAAAAP////8AAAAAAP///////wAAAAAAAP////8AAAAAAP///////wAAAAAAAP////8AAAAAAP///////wAAAAAAAP////8AAAAAAP///////wAAAAAAAP////8AAAAAAP///////wAAAAAAAP////8AAAAAAP///////wAAAAAAAP////8AAAAAAP///////wAAAAAAAP////8AAAAAAP///////wAAAAAAAP////8AAAAAAP///////wAAAAAAAP////8AAAAAAP///////wAAAAAAAP////8AAAAAAP///////wAAAAAAAP////8AAAAAAAAAAAAAAAAAAAAAAAAAAAAAAAAAAAAAAAAAAAAAAAAAAAAAAAAAAAAAAAAAAAAAAAAAAAAAAAAAAAAAAAAAAAAAAAAAAAAAAAAAAAAAAAAAAAAAAAAAAAAAAAAAAAAAAAAAAAAAAAAAAAAAAAAAAAAAAAAAAAAAAAAAAAAAAAAAAAAAAAAAAAAAAAAAAAAAAAAAAAAAAAAAAAAAAAAAAAAAAAAAAAAAAAAAAAAAAAAAAAAAAAAAAAAAAAAAAAAAAAAAAAAAAAAAAAAAAAAAAAAAAAAAAAAAAAAAAAAAAAAAAAAAAAAAAAAAAAAAAAAAAAAAAAAAAAAAAAAAAAAAAAAAAAAAAAAAAAAAAAAAAAAAAAAAAAAAAAAAAAAAAAAAAAAAAAAAAAAAAAAAAAAAAAAAAAAAAAAAAAAAAAAAAAAAAAAAAAAAAAAAAAAAAAAAAAAAAAAAAAAAAAAAAAAAAAAAAAAAAAAAAAAAAAAAAAAAAAAAAAAAAAAAAAAAAAAAAAAAAAAAAAAAAAAAAAAAAAAAAAAAAAAAAAAAAAAAAAAAAAAAAAAAAAAAAAAAAAAAAAAAAAAAAAAAAAAAAAAAAAAAAAAAAAAAAAAAAAAAAAAAAAAAAAAAAAAAAAAAAAAAAAAAAAAAAAAAAAAAAAAAAAAAAAAAAAAAAAAAAAAAAAAAAAAAAAAAAAAAAAAAAAAAAAAAAAAAAAAAAAAAAAAAAAAAAAAAAAAAAAAAAAAAAAAAAAAAAAAAAAAAAAAAAAAAAAAAAAAAAAAAAAAAAAAAAAAAAAAAAAAAAAAAAAAAAAAAAAAAAAAAAAAAAAAAAAAAAAAAAAAAAAAAAAAAAAAAAAAAAAAAAAAAAAAAAAAAAAAAAAAAAAAAAAAAAAAAAAAAAAAAAAAAAAAAAAAAAAAAAAAAAAAAAAAAAAAAAAAAAAAAAAAAAAAAAAAAAAAAAAAAAAAAAAAAAAAAAAAAAAAAAAAAAAAAAAAAAAAAAAAAAAAAAAAAAAAAAAAAAAAAAAAAAAAAAAAAAAAAAAAAAAAAAAAAAAAAAAAAAAAAAAAAAAAAAAAAAAAAAAAAAAAAAAAAAAAAAAAAAAAAAAAAAAAAAAAAAAAAAAAAAAAAAAAAAAAAAAAAAAAAAAAAAAAAAAAAAAAAAAAAAAAAAAAAAAAAAAAAAAAAAAAAAAAAAAAAAAAAAAAAAAAAAAAAAAAAAAAAAAAAAAAAAAAAAAAAAAAAAAAAAAAAAAAAAAAAAAAAAAAAAAAAAAAAAAAAAAAAAAAAAAAAAAAAAAAAAAAAAAAAAAAAAAAAAAAAAAAAAAAAAAAAAAAAAAAAAAAAAAAAAAAAAAAAAAAAAAAAAAAAAAAAAAAAAAAAAAAAAAAAAAAAAAAAAAAAAAAAAAAAAAAAAAAAAAAAAAAAAAAAAAAAAAAAAAAAAAAAAAAAAAAAAAAAAAAAAAAAAAAAAAAAAAAAAAAAAAAAAAAAAAAAAAAAAAAAAAAAAAAAAAAAAAAAAAAAAAAAAAAAAAAAAAAAAAAAAAAAAAAAAAAAAAAAAAAAAAAAAAAAAAAAAAAAAAAAAAAAAAAAAAAAAAAAAAAAAAAAAAAAAAAAAAAAAAAAAAAAAAAAAAAAAAAAAAAAAAAAAAAAAAAAAAAAAAAAAAAAAAAAAAAAAAAAAAAAAAAAAAAAAAAAAAAAAAAAAAAAAAAAAAAAAAAAAAAAAAAAAAAAAAAAAAAAAAAAAAAAAAAAAAAAAAAAAAAAAAAAAAAAAAAAAAAAAAAAAAAAAAAAAAAAAAAAAAAAAAAAAAAAAAAAAAAAAAAAAAAAAAAAAAAAAAAAAAAAAAAAAAAAAAAAAAAAAAAAAAAAAAAAAAAAAAAAAAAAAAAAAAAAAAAAAAAAAAAAAAAAAAAAAAAAAAAAAAAAAAAAAAAAAAAAAAAAAAAAAAAAAAAAAAAAAAAAAAAAAAAAAAAAAAAAAAAAAAAAAAAAAAAAAAAAAAAAAAAAAAAAAAAAAAAAAAAAAAAAAAAAAAAAAAAAAAAAAAAAAAAAAAAAAAAAAAAAAAAAAAAAAAAAAAAAAAAAAAAAAAAAAAAAAAAAAAAAAAAAAAAAAAAAAAAAAAAAAAAAAAAAAAAAAAAAAAAAAAAAAAAAAAAAAAAAAAAAAAAAAAAAAAAAAAAAAAAAAAAAAAAAAAAAAAAAAAAAAAAAAAAAAAAAAAAAAAAAAAAAAAAAAAAAAAAAAAAAAAAAAAAAAAAAAAAAAAAAAAAAAAAAAAAAAAAAAAAAAAAAAAAAAAAAAAAAAAAAAAAAAAAAAAAAAAAAAAAAAAAAAAAAAAAAAAAAAAAAAAAAAAAAAAAAAAAAAAAAAAAAAAAAAAAAAAAAAAAAAAAAAAAAAAAAAAAAAAAAAAAAAAAAAAAAAAAAAAAAAAAAAAAAAAAAAAAAAAAAAAAAAAAAAAAAAAAAAAAAAAAAAAAAAAAAAAAAAAAAAAAAAAAAAAAAAAAAAAAAAAAAAAAAAAAAAAAAAAAAAAAAAAAAAAAAAAAAAAAAAAAAAAAAAAAAAAAAAAAAAAAAAAAAAAAAAAAAAAAAAAAAAAAAAAAAAAAAAAAAAAAAAAAAAAAAAAAAAAAAAAAAAAAAAAAAAAAAAAAAAAAAAAAAAAAAAAAAAAAAAAAAAAAAAAAAAAAAAAAAAAAAAAAAAAAAAAAAAAAAAAAAAAAAAAAAAAAAAAAAAAAAAAAAAAAAAAAAAAAAAAAAAAAAAAAAAAAAAAAAAAAAAAAAAAAAAAAAAAAAAAAAAAAAAAAAAAAAAAAAAAAAAAAAAAAAAAAAAAAAAAAAAAAAAAAAAAAAAAAAAAAAAAAAAAAAAAAAAAAAAAAAAAAAAAAAAAAAAAAAAAAAAAAAAAAAAAAAAAAAAAAAAAAAAAAAAAAAAAAAAAAAAAAAAAAAAAAAAAAAAAAAAAAAAAAAAAAAAAAAAAAAAAAAAAAAAAAAAAAAAAAAAAAAAAAAAAAAAAAAAAAAAAAAAAAAAAAAAAAAAAAAAAAAAAAAAAAAAAAAAAAAAAAAAAAAAAAAAAAAAAAAAAAAAAAAAAAAAAAAAAAAAAAAAAAAAAAAAAAAAAAAAAAAAAAAAAAAAAAAAAAAAAAAAAAAAAAAAAAAAAAAAAAAAAAAAAAAAAAAAAAAAAAAAAAAAAAAAAAAAAAAAAAAAAAAAAAAAAAAAAAAAAAAAAAAAAAAAAAAAAAAAAAAAAAAAAAAAAAAAAAAAAAAAAAAAAAAAAAAAAAAAAAAAAAAAAAAAAAAAAAAAAAAAAAAAAAAAAAAAAAAAAAAAAAAAAAAAAAAAAAAAAAAAAAAAAAAAAAAAAAAAAAAAAAAAAAAAAAAAAAAAAAAAAAAAAAAAAAAAAAAAAAAAAAAAAAAAAAAAAAAAAAAAAAAAAAAAAAAAAAAAAAAAAAAAAAAAAAAAAAAAAAAAAAAAAAAAAAAAAAAAAAAAAAAAAAAAAAAAAAAAAAAAAAAAAAAAAAAAAAAAAAAAAAAAAAAAAAAAAAAAAAAAAAAAAAAAAAAAAAAAAAAAAAAAAAAAAAAAAAAAAAAAAAAAAAAAAAAAAAAAAAAAAAAAAAAAAAAAAAAAAAAAAAAAAAAAAAAAAAAAAAAAAAAAAAAAAAAAAAAAAAAAAAAAAAAAAAAAAAAAAAAAAAAAAAAAAAAAAAAAAAAAAAAAAAAAAAAAAAAAAAAAAAAAAAAAAAAAAAAAAAAAAAAAAAAAAAAAAAAAAAAAAAAAAAAAAAAAAAAAAAAAAAAAAAAAAAAAAAAAAAAAAAAAAAAAAAAAAAAAAAAAAAAAAAAAAAAAAAAAAAAAAAAAAAAAAAAAAAAAAAAAAAAAAAAAAAAAAAAAAAAAAAAAAAAAAAAAAAAAAAAAAAAAAAAAAAAAAAAAAAAAAAAAAAAAAAAAAAAAAAAAAAAAAAAAAAAAAAAAAAAAAAAAAAAAAAAAAAAAAAAAAAAAAAAAAAAAAAAAAAAAAAAAAAAAAAAAAAAAAAAAAAAAAAAAAAAAAAAAAAAAAAAAAAAAAAAAAAAAAAAAAAAAAAAAAAAAAAAAAAAAAAAAAAAAAAAAAAAAAAAAAAAAAAAAAAAAAAAAAAAAAAAAAAAAAAAAAAAAAAAAAAAAAAAAAAAAAAAAAAAAAAAAAAAAAAAAAAAAAAAAAAAAAAAAAAAAAAAAAAAAAAAAAAAAAAAAAAAAAAAAAAAAAAAAAAAAAAAAAAAAAAAAAAAAAAAAAAAAAAAAAAAAAAAAAAAAAAAAAAAAAAAAAAAAAAAAAAAAAAAAAAAAAAAAAAAAAAAAAAAAAAAAAAAAAAAAAAAAAAAAAAAAAAAAAAAAAAAAAAAAAAAAAAAAAAAAAAAAAAAAAAAAAAAAAAAAAAAAAAAAAAAAAAAAAAAAAAAAAAAAAAAAAAAAAAAAAAAAAAAAAAAAAAAAAAAAAAAAAAAAAAAAAAAAAAAAAAAAAAAAAAAAAAAAAAAAAAAAAAAAAAAAAAAAAAAAAAAAAAAAAAAAAAAAAAAAAAAAAAAAAAAAAAAAAAAAAAAAAAAAAAAAAAAAAAAAAAAAAAAAAAAAAAAAAAAAAAAAAAAAAAAAAAAAAAAAAAAAAAAAAAAAAAAAAAAAAAAAAAAAAAAAAAAAAAAAAAAAAAAAAAAAAAAAAAAAAAAAAAAAAAAAAAAAAAAAAAAAAAAAAAAAAAAAAAAAAAAAAAAAAAAAAAAAAAAAAAAAAAAAAAAAAAAAAAAAAAAAAAAAAAAAAAAAAAAAAAAAAAAAAAAAAAAAAAAAAAAAAAAAAAAAAAAAAAAAAAAAAAAAAAAAAAAAAAAAAAAAAAAAAAAAAAAAAAAAAAAAAAAAAAABAUBAQEBAQEBAQEBAQEBAQIAAAAAAAAAAwAAAAMAAAAA/////wQAJwwAAAAAAAAAAAAAIAD///////////////8AAAD///////////////8DAAAAAwD///////8DAAAAAgD///////8DAAAAAgD///////8DAAAAAgD///////////////////////////////////////////////////////////////////////////////////////////////////////////////////////////////////////////////////////////////////////////////////////////////////////////////////////////////////////////////////////////////////////////////////////////////////////////////////////////////////////////////////////////////////////////////////////////////////////////////////////////////////////////////////////////////8BACAA////////////////AAAO////////AwAAAAIA////////////////////////////////////////////////////////////////////////////////////////////////////////////////////////////////////////////////////////////////////////////////////////////////////////////////////////////////////////////////////////////////////////////////////////////////////////////////////////////////////////////////////////////////////////////////////////////////////////////////////////////////////////////////////////////////////////////////////////////////////////////////////////AgAEAP///////wQAAAACABAAC9e7gHhNo1xIiXgDRA3pNxoFAAAAAAADAAAAAwADAAAAAQADAAAAAAD///////8DAAAAAAD///////8DAAAAAAD///////8DAAEA////////BAAAAAMAEAALfYUeA7aL1EOtr+jf1Xw+IwUAAAABAAMAAAAAAAMAAAACAAAAAAAAAAAAAAAAAAAAAAAAAAAAAAAAAAAAAAAAAAAAAAAAAAAAAAAAAAAAAAAAAAAAAAAAAAAAAAAAAAAAAAAAAAAAAAAAAAAAAAAAAAAAAAAAAAAAAAAAAAAAAAAAAAAAAAAAAAAAAAAAAAAAAAAAAAAAAAAAAAAAAAAAAAAAAAAAAAAAAAAAAAAAAAAAAAAAAAAAAAAAAAAAAAAAAAAAAAAAAAAAAAAAAAAAAAAAAAAAAAAAAAAAAAAAAAAAAAAAAAAAAAAAAAAAAAAAAAAAAAAAAAAAAAAAAAAAAAAAAAAAAAAAAAAAAAAAAAAAAAAAAAAAAAAAAAAAAAAAAAAAAAAAAAAAAAAAAAAAAAAAAAAAAAAAAAAAAAAAAAAAAAAAAAAAAAAAAAAAAAAAAAAAAAAAAAAAAAAAAAAAAAAAAAAAAAAAAAAAAAAAAAAAAAAAAAAAAAAAAAAAAAAAAAAAAAAAAAAAAAAAAAAAAAAAAAAAAAAAAAAAAAAAAAAAAAAAAAAAAAAAAAAAAAAAAAAAAAAAAAAAAAAAAAAAAAAAAAAAAAAAAAAAAAAAAAAAAAAAAAAAAAAAAAAAAAAAAAAAAAAAAAAAAAAAAAAAAAAAAAAAAAAAAAAAAAAAAAAAAAAAAAAAAAAAAAAAAAAAAAAAAAAAAAAAAAAAAAAAAAAAAAAAAAAAAAAAAAAAAAAAAAAAAAAAAAAAAAAAAAAAAAAAAAAAAAAAAAAAAAAAAAAAAAAAAAAAAAAAAAAAAAAAAAAAAAAAAAAAAAAAAAAAAAAAAAAAAAAAAAAAAAAAAAAAAAAAAAAAAAAAAAAAAAAAAAAAAAAAAAAAAAAAAAAAAAAAAAAAAAAAAAAAAAAAAAAAAAAAAAAAAAAAAAAAAAAAAAAAAAAAAAAAAAAAAAAAAAAAAAAAAAAAAAAAAAAAAAAAAAAAAAAAAAAAAAAAAAAAAAAAAAAAAAAAAAAAAAAAAAAAAAAAAAAAAAAAAAAAAAAAAAAAAAAAAAAAAAAAAAAAAAAAAAAAAAAAAAAAAAAAAAAAAAAAAAAAAAAAAAAAAAAAAAAAAAAAAAAAAAAAAAAAAAAAAAAAAAAAAAAAAAAAAAAAAAAAAAAAAAAAAAAAAAAAAAAAAAAAAAAAAAAAAAAAAAAAAAAAAAAAAAAAAAAAAAAAAAAAAAAAAAAAAAAAAAAAAAAAAAAAAAAAAAAAAAAAAAAAAAAAAAAAAAAAAAAAAAAAAAAAAAAAAAAAAAAAAAAAAAAAAAAAAAAAAAAAAAAAAAAAAAAAAAAAAAAAAAAAAAAAAAAAAAAAAAAAAAAAAAAAAAAAAAAAAAAAAAAAAAAAAAAAAAAAAAAAAAAAAAAAAAAAAAAAAAAAAAAAAAAAAAAAAAAAAAAAAAAAAAAAAAAAAAAAAAAAAAAAAAAAAAAAAAAAAAAAAAAAAAAAAAAAAAAAAAAAAAAAAAAAAAAAAAAAAAAAAAAAAAAAAAAAAAAAAAAAAAAAAAAAAAAAAAAAAAAAAAAAAAAAAAAAAAAAAAAAAAAAAAAAAAAAAAAAAAAAAAAAAAAAAAAAAAAAAAAAAAAAAAAAAAAAAAAAAAAAAAAAAAAAAAAAAAAAAAAAAAAAAAAAAAAAAAAAAAAAAAAAAAAAAAAAAAAAAAAAAAAAAAAAAAAAAAAAAAAAAAAAAAAAAAAAAAAAAAAAAAAAAAAAAAAAAAAAAAAAAAAAAAAAAAAAAAAAAAAAAAAAAAAAAAAAAAAAAAAAAAAAAAAAAAAAAAAAAAAAAAAAAAAAAAAAAAAAAAAAAAAAAAAAAAAAAAAAAAAAAAAAAAAAAAAAAAAAAAAAAAAAAAAAAAAAAAAAAAAAAAAAAAAAAAAAAAAAAAAAAAAAAAAAAAAAAAAAAAAAAAAAAAAAAAAAAAAAAAAAAAAAAAAAAAAAAAAAAAAAAAAAAAAAAAAAAAAAAAAAAAAAAAAAAAAAAAAAAAAAAAAAAAAAAAAAAAAAAAAAAAAAAAAAAAAAAAAAAAAAAAAAAAAAAAAAAAAAAAAAAAAAAAAAAAAAAAAAAAAAAAAAAAAAAAAAAAAAAAAAAAAAAAAAAAAAAAAAAAAAAAAAAAAAAAAAAAAAAAAAAAAAAAAAAAAAAAAAAAAAAAAAAAAAAAAAAAAAAAAAAAAAAAAAAAAAAAAAAAAAAAAAAAAAAAAAAAAAAAAAAAAAAAAAAAAAAAAAAAAAAAAAAAAAAAAAAAAAAAAAAAAAAAAAAAAAAAAAAAAAAAAAAAAAAAAAAAAAAAAAAAAAAAAAAAAAAAAAAAAAAAAAAAAAAAAAAAAAAAAAAAAAAAAAAAAAAAAAAAAAAAAAAAAAAAAAAAAAAAAAAAAAAAAAAAAAAAAAAAAAAAAAAAAAAAAAAAAAAAAAAAAAAAAAAAAAAAAAAAAAAAAAAAAAAAAAAAAAAAAAAAAAAAAAAAAAAAAAAAAAAAAAAAAAAAAAAAAAAAAAAAAAAAAAAAAAAAAAAAAAAAAAAAAAAAAAAAAAAAAAAAAAAAAAAAAAAAAAAAAAAAAAAAAAAAAAAAAAAAAAAAAAAAAAAAAAAAAAAAAAAAAAAAAAAAAAAAAAAAAAAAAAAAAAAAAAAAAAAAAAAAAAAAAAAAAAAAAAAAAAAAAAAAAAAAAAAAAAAAAAAAAAAAAAAAAAAAAAAAAAAAAAAAAAAAAAAAAAAAAAAAAAAAAAAAAAAAAAAAAAAAAAAAAAAAAAAAAAAAAAAAAAAAAAAAAAAAAAAAAAAAAAAAAAAAAAAAAAAAAAAAAAAAAAAAAAAAAAAAAAAAAAAAAAAAAAAAAAAAAAAAAAAAAAAAAAAAAAAAAAAAAAAAAAAAAAAAAAAAAAAAAAAAAAAAAAAAAAAAAAAAAAAAAAAAAAAAAAAAAAAAAAAAAAAAAAAAAAAAAAAAAAAAAAAAAAAAAAAAAAAAAAAAAAAAAAAAAAAAAAAAAAAAAAAAAAAAAAAAAAAAAAAAAAAAAAAAAAAAAAAAAAAAAAAAAAAAAAAAAAAAAAAAAAAAAAAAAAAAAAAAAAAAAAAAAAAAAAAAAAAAAAAAAAAAAAAAAAAAAAAAAAAAAAAAAAAAAAAAAAAAAAAAAAAAAAAAAAAAAAAAAAAAAAAAAAAAAAAAAAAAAAAAAAAAAAAAAAAAAAAAAAAAAAAAAAAAAAAAAAAAAAAAAAAAAAAAAAAAAAAAAAAAAAAAAAAAAAAAAAAAAAAAAAAAAAAAAAAAAAAAAAAAAAAAAAAAAAAAAAAAAAAAAAAAAAAAAAAAAAAAAAAAAAAAAAAAAAAAAAAAAAAAAAAAAAAAAAAAAAAAAAAAAAAAAAAAAAAAAAAAAAAAAAAAAAAAAAAAAAAAAAAAAAAAAAAAAAAAAAAAAAAAAAAAAAAAAAAAAAAAAAAAAAAAAAAAAAAAAAAAAAAAAAAAAAAAAAAAAAAAAAAAAAAAAAAAAAAAAAAAAAAAAAAAAAAAAAAAAAAAAAAAAAAAAAAAAAAAAAAAAAAAAAAAAAAAAAAAAAAAAAAAAAAAAAAAAAAAAAAAAAAAAAAAAAAAAAAAAAAAAAAAAAAAAAAAAAAAAAAAAAAAAAAAAAAAAAAAAAAAAAAAAAAAAAAAAAAAAAAAAAAAAAAAAAAAAAAAAAAAAAAAAAAAAAAAAAAAAAAAAAAAAAAAAAAAAAAAAAAAAAAAAAAAAAAAAAAAAAAAAAAAAAAAAAAAAAAAAAAAAAAAAAAAAAAAAAAAAAAAAAAAAAAAAAAAAAAAAAAAAAAAAAAAAAAAAAAAAAAAAAAAAAAAAAAAAAAAAAAAAAAAAAAAAAAAAAAAAAAAAAAAAAAAAAAAAAAAAAAAAAAAAAAAAAAAAAAAAAAAAAAAAAAAAAAAAAAAAAAAAAAAAAAAAAAAAAAAAAAAAAAAAAAAAAAAAAAAAAAAAAAAAAAAAAAAAAAAAAAAAAAAAAAAAAAAAAAAAAAAAAAAAAAAAAAAAAAAAAAAAAAAAAAAAAAAAAAAAAAAAAAAAAAAAAAAAAAAAAAAAAAAAAAAAAAAAAAAAAAAAAAAAAAAAAAAAAAAAAAAAAAAAAAAAAAAAAAAAAAAAAAAAAAAAAAAAAAAAAAAAAAAAAAAAAAAAAAAAAAAAAAAAAAAAAAAAAAAAAAAAAAAAAAAAAAAQAAAADAAAAAP////8EAPwLAAAAAAAAAAAAACAB////////////////AAAA////////////////BAAAAAMA////////BAAAAAIA////////BAAAAAIA////////BAAAAAIA////////BAAAAAIA////////////////////////////////////////////////////////////////////////////////////////////////////////////////////////////////////////////////////////////////////////////////////////////////////////////////////////////////////////////////////////////////////////////////////////////////////////////////////////////////////////////////////////////////////////////////////////////////////////////////////////////////////////////////AQAgAf///////////////wAADv///////wQAAAACAP///////////////////////////////////////////////////////////////////////////////////////////////////////////////////////////////////////////////////////////////////////////////////////////////////////////////////////////////////////////////////////////////////////////////////////////////////////////////////////////////////////////////////////////////////////////////////////////////////////////////////////////////////////////////////////////////////////////////////////////////////////////////////////wIABQEDAAAAAgD///////8aAAZMaW5rZWRTaGFwZXNEYXRhUHJvcGVydHlfMAUAAAAAAAQAAAADAAQAAAABAAQAAAAAAP///////wQAAAAAAP///////wQAAAAAAP///////wQAAAAAAP///////wMAAQEDAAAAAwD///////8lAAZMaW5rZWRTaGFwZVByZXNlbnRhdGlvblNldHRpbmdzRGF0YV8wBQAAAAEABAAAAAAABAAAAAIAAAAAAAAAAAAAAAAAAAAAAAAAAAAAAAAAAAAAAAAAAAAAAAAAAAAAAAAAAAAAAAAAAAAAAAAAAAAAAAAAAAAAAAAAAAAAAAAAAAAAAAAAAAAAAAAAAAAAAAAAAAAAAAAAAAAAAAAAAAAAAAAAAAAAAAAAAAAAAAAAAAAAAAAAAAAAAAAAAAAAAAAAAAAAAAAAAAAAAAAAAAAAAAAAAAAAAAAAAAAAAAAAAAAAAAAAAAAAAAAAAAAAAAAAAAAAAAAAAAAAAAAAAAAAAAAAAAAAAAAAAAAAAAAAAAAAAAAAAAAAAAAAAAAAAAAAAAAAAAAAAAAAAAAAAAAAAAAAAAAAAAAAAAAAAAAAAAAAAAAAAAAAAAAAAAAAAAAAAAAAAAAAAAAAAAAAAAAAAAAAAAAAAAAAAAAAAAAAAAAAAAAAAAAAAAAAAAAAAAAAAAAAAAAAAAAAAAAAAAAAAAAAAAAAAAAAAAAAAAAAAAAAAAAAAAAAAAAAAAAAAAAAAAAAAAAAAAAAAAAAAAAAAAAAAAAAAAAAAAAAAAAAAAAAAAAAAAAAAAAAAAAAAAAAAAAAAAAAAAAAAAAAAAAAAAAAAAAAAAAAAAAAAAAAAAAAAAAAAAAAAAAAAAAAAAAAAAAAAAAAAAAAAAAAAAAAAAAAAAAAAAAAAAAAAAAAAAAAAAAAAAAAAAAAAAAAAAAAAAAAAAAAAAAAAAAAAAAAAAAAAAAAAAAAAAAAAAAAAAAAAAAAAAAAAAAAAAAAAAAAAAAAAAAAAAAAAAAAAAAAAAAAAAAAAAAAAAAAAAAAAAAAAAAAAAAAAAAAAAAAAAAAAAAAAAAAAAAAAAAAAAAAAAAAAAAAAAAAAAAAAAAAAAAAAAAAAAAAAAAAAAAAAAAAAAAAAAAAAAAAAAAAAAAAAAAAAAAAAAAAAAAAAAAAAAAAAAAAAAAAAAAAAAAAAAAAAAAAAAAAAAAAAAAAAAAAAAAAAAAAAAAAAAAAAAAAAAAAAAAAAAAAAAAAAAAAAAAAAAAAAAAAAAAAAAAAAAAAAAAAAAAAAAAAAAAAAAAAAAAAAAAAAAAAAAAAAAAAAAAAAAAAAAAAAAAAAAAAAAAAAAAAAAAAAAAAAAAAAAAAAAAAAAAAAAAAAAAAAAAAAAAAAAAAAAAAAAAAAAAAAAAAAAAAAAAAAAAAAAAAAAAAAAAAAAAAAAAAAAAAAAAAAAAAAAAAAAAAAAAAAAAAAAAAAAAAAAAAAAAAAAAAAAAAAAAAAAAAAAAAAAAAAAAAAAAAAAAAAAAAAAAAAAAAAAAAAAAAAAAAAAAAAAAAAAAAAAAAAAAAAAAAAAAAAAAAAAAAAAAAAAAAAAAAAAAAAAAAAAAAAAAAAAAAAAAAAAAAAAAAAAAAAAAAAAAAAAAAAAAAAAAAAAAAAAAAAAAAAAAAAAAAAAAAAAAAAAAAAAAAAAAAAAAAAAAAAAAAAAAAAAAAAAAAAAAAAAAAAAAAAAAAAAAAAAAAAAAAAAAAAAAAAAAAAAAAAAAAAAAAAAAAAAAAAAAAAAAAAAAAAAAAAAAAAAAAAAAAAAAAAAAAAAAAAAAAAAAAAAAAAAAAAAAAAAAAAAAAAAAAAAAAAAAAAAAAAAAAAAAAAAAAAAAAAAAAAAAAAAAAAAAAAAAAAAAAAAAAAAAAAAAAAAAAAAAAAAAAAAAAAAAAAAAAAAAAAAAAAAAAAAAAAAAAAAAAAAAAAAAAAAAAAAAAAAAAAAAAAAAAAAAAAAAAAAAAAAAAAAAAAAAAAAAAAAAAAAAAAAAAAAAAAAAAAAAAAAAAAAAAAAAAAAAAAAAAAAAAAAAAAAAAAAAAAAAAAAAAAAAAAAAAAAAAAAAAAAAAAAAAAAAAAAAAAAAAAAAAAAAAAAAAAAAAAAAAAAAAAAAAAAAAAAAAAAAAAAAAAAAAAAAAAAAAAAAAAAAAAAAAAAAAAAAAAAAAAAAAAAAAAAAAAAAAAAAAAAAAAAAAAAAAAAAAAAAAAAAAAAAAAAAAAAAAAAAAAAAAAAAAAAAAAAAAAAAAAAAAAAAAAAAAAAAAAAAAAAAAAAAAAAAAAAAAAAAAAAAAAAAAAAAAAAAAAAAAAAAAAAAAAAAAAAAAAAAAAAAAAAAAAAAAAAAAAAAAAAAAAAAAAAAAAAAAAAAAAAAAAAAAAAAAAAAAAAAAAAAAAAAAAAAAAAAAAAAAAAAAAAAAAAAAAAAAAAAAAAAAAAAAAAAAAAAAAAAAAAAAAAAAAAAAAAAAAAAAAAAAAAAAAAAAAAAAAAAAAAAAAAAAAAAAAAAAAAAAAAAAAAAAAAAAAAAAAAAAAAAAAAAAAAAAAAAAAAAAAAAAAAAAAAAAAAAAAAAAAAAAAAAAAAAAAAAAAAAAAAAAAAAAAAAAAAAAAAAAAAAAAAAAAAAAAAAAAAAAAAAAAAAAAAAAAAAAAAAAAAAAAAAAAAAAAAAAAAAAAAAAAAAAAAAAAAAAAAAAAAAAAAAAAAAAAAAAAAAAAAAAAAAAAAAAAAAAAAAAAAAAAAAAAAAAAAAAAAAAAAAAAAAAAAAAAAAAAAAAAAAAAAAAAAAAAAAAAAAAAAAAAAAAAAAAAAAAAAAAAAAAAAAAAAAAAAAAAAAAAAAAAAAAAAAAAAAAAAAAAAAAAAAAAAAAAAAAAAAAAAAAAAAAAAAAAAAAAAAAAAAAAAAAAAAAAAAAAAAAAAAAAAAAAAAAAAAAAAAAAAAAAAAAAAAAAAAAAAAAAAAAAAAAAAAAAAAAAAAAAAAAAAAAAAAAAAAAAAAAAAAAAAAAAAAAAAAAAAAAAAAAAAAAAAAAAAAAAAAAAAAAAAAAAAAAAAAAAAAAAAAAAAAAAAAAAAAAAAAAAAAAAAAAAAAAAAAAAAAAAAAAAAAAAAAAAAAAAAAAAAAAAAAAAAAAAAAAAAAAAAAAAAAAAAAAAAAAAAAAAAAAAAAAAAAAAAAAAAAAAAAAAAAAAAAAAAAAAAAAAAAAAAAAAAAAAAAAAAAAAAAAAAAAAAAAAAAAAAAAAAAAAAAAAAAAAAAAAAAAAAAAAAAAAAAAAAAAAAAAAAAAAAAAAAAAAAAAAAAAAAAAAAAAAAAAAAAAAAAAAAAAAAAAAAAAAAAAAAAAAAAAAAAAAAAAAAAAAAAAAAAAAAAAAAAAAAAAAAAAAAAAAAAAAAAAAAAAAAAAAAAAAAAAAAAAAAAAAAAAAAAAAAAAAAAAAAAAAAAAAAAAAAAAAAAAAAAAAAAAAAAAAAAAAAAAAAAAAAAAAAAAAAAAAAAAAAAAAAAAAAAAAAAAAAAAAAAAAAAAAAAAAAAAAAAAAAAAAAAAAAAAAAAAAAAAAAAAAAAAAAAAAAAAAAAAAAAAAAAAAAAAAAAAAAAAAAAAAAAAAAAAAAAAAAAAAAAAAAAAAAAAAAAAAAAAAAAAAAAAAAAAAAAAAAAAAAAAAAAAAAAAAAAAAAAAAAAAAAAAAAAAAAAAAAAAAAAAAAAAAAAAAAAAAAAAAAAAAAAAAAAAAAAAAAAAAAAAAAAAAAAAAAAAAAAAAAAAAAAAAAAAAAAAAAAAAAAAAAAAAAAAAAAAAAAAAAAAAAAAAAAAAAAAAAAAAAAAAAAAAAAAAAAAAAAAAAAAAAAAAAAAAAAAAAAAAAAAAAAAAAAAAAAAAAAAAAAAAAAAAAAAAAAAAAAAAAAAAAAAAAAAAAAAAAAAAAAAAAAAAAAAAAAAAAAAAAAAAAAAAAAAAAAAAAAAAAAAAAAAAAAAAAAAAAAAAAAAAAAAAAAAAAAAAAAAAAAAAAAAAAAAAAAAAAAAAAAAAAAAAAAAAAAAAAAAAAAAAAAAAAAAAAAAAAAAAAAAAAAAAAAAAAAAAAAAAAAAAAAAAAAAAAAAAAAAAAAAAAAAAAAAAAAAAAAAAAAAAAAAAAAAAAAAAAAAAAAAAAAAAAAAAAAAAAAAAAAAAAAAAAAAAAAAAAAAAAAAAAAAAAAAAAAAAAAAAAAAAAAAAAAAAAAAAAAAAAAAAAAAAAAAAAAAAAAAAAAAAAAAAAAAAAAAAAAAAAAAAAAAAAAAAAAAAAAAAAAAAAAAAAAAAAAAAAAAAAAAAAAAAAAAAAAAAAAAAAAAAAAFAAAABAAAAAD/////AgCODgAAAAAAAAAAAAD/////gwCDAAAABV9pZAAQAAAABNe7gHhNo1xIiXgDRA3pNxoDRGF0YQAbAAAABExpbmtlZFNoYXBlRGF0YQAFAAAAAAACTmFtZQAZAAAATGlua2VkU2hhcGVzRGF0YVByb3BlcnR5ABBWZXJzaW9uAAAAAAAJTGFzdFdyaXRlAJuC+f+AAQAAAAEA/////8YAxgAAAAVfaWQAEAAAAAR9hR4DtovUQ62v6N/VfD4jA0RhdGEAUwAAAAhQcmVzZW50YXRpb25TY2FubmVkRm9yTGlua2VkU2hhcGVzAAECTnVtYmVyRm9ybWF0U2VwYXJhdG9yTW9kZQAKAAAAQXV0b21hdGljAAACTmFtZQAkAAAATGlua2VkU2hhcGVQcmVzZW50YXRpb25TZXR0aW5nc0RhdGEAEFZlcnNpb24AAAAAAAlMYXN0V3JpdGUA6oL5/4ABAAAAAAAAAAAAAAAAAAAAAAAAAAAAAAAAAAAAAAAAAAAAAAAAAAAAAAAAAAAAAAAAAAAAAAAAAAAAAAAAAAAAAAAAAAAAAAAAAAAAAAAAAAAAAAAAAAAAAAAAAAAAAAAAAAAAAAAAAAAAAAAAAAAAAAAAAAAAAAAAAAAAAAAAAAAAAAAAAAAAAAAAAAAAAAAAAAAAAAAAAAAAAAAAAAAAAAAAAAAAAAAAAAAAAAAAAAAAAAAAAAAAAAAAAAAAAAAAAAAAAAAAAAAAAAAAAAAAAAAAAAAAAAAAAAAAAAAAAAAAAAAAAAAAAAAAAAAAAAAAAAAAAAAAAAAAAAAAAAAAAAAAAAAAAAAAAAAAAAAAAAAAAAAAAAAAAAAAAAAAAAAAAAAAAAAAAAAAAAAAAAAAAAAAAAAAAAAAAAAAAAAAAAAAAAAAAAAAAAAAAAAAAAAAAAAAAAAAAAAAAAAAAAAAAAAAAAAAAAAAAAAAAAAAAAAAAAAAAAAAAAAAAAAAAAAAAAAAAAAAAAAAAAAAAAAAAAAAAAAAAAAAAAAAAAAAAAAAAAAAAAAAAAAAAAAAAAAAAAAAAAAAAAAAAAAAAAAAAAAAAAAAAAAAAAAAAAAAAAAAAAAAAAAAAAAAAAAAAAAAAAAAAAAAAAAAAAAAAAAAAAAAAAAAAAAAAAAAAAAAAAAAAAAAAAAAAAAAAAAAAAAAAAAAAAAAAAAAAAAAAAAAAAAAAAAAAAAAAAAAAAAAAAAAAAAAAAAAAAAAAAAAAAAAAAAAAAAAAAAAAAAAAAAAAAAAAAAAAAAAAAAAAAAAAAAAAAAAAAAAAAAAAAAAAAAAAAAAAAAAAAAAAAAAAAAAAAAAAAAAAAAAAAAAAAAAAAAAAAAAAAAAAAAAAAAAAAAAAAAAAAAAAAAAAAAAAAAAAAAAAAAAAAAAAAAAAAAAAAAAAAAAAAAAAAAAAAAAAAAAAAAAAAAAAAAAAAAAAAAAAAAAAAAAAAAAAAAAAAAAAAAAAAAAAAAAAAAAAAAAAAAAAAAAAAAAAAAAAAAAAAAAAAAAAAAAAAAAAAAAAAAAAAAAAAAAAAAAAAAAAAAAAAAAAAAAAAAAAAAAAAAAAAAAAAAAAAAAAAAAAAAAAAAAAAAAAAAAAAAAAAAAAAAAAAAAAAAAAAAAAAAAAAAAAAAAAAAAAAAAAAAAAAAAAAAAAAAAAAAAAAAAAAAAAAAAAAAAAAAAAAAAAAAAAAAAAAAAAAAAAAAAAAAAAAAAAAAAAAAAAAAAAAAAAAAAAAAAAAAAAAAAAAAAAAAAAAAAAAAAAAAAAAAAAAAAAAAAAAAAAAAAAAAAAAAAAAAAAAAAAAAAAAAAAAAAAAAAAAAAAAAAAAAAAAAAAAAAAAAAAAAAAAAAAAAAAAAAAAAAAAAAAAAAAAAAAAAAAAAAAAAAAAAAAAAAAAAAAAAAAAAAAAAAAAAAAAAAAAAAAAAAAAAAAAAAAAAAAAAAAAAAAAAAAAAAAAAAAAAAAAAAAAAAAAAAAAAAAAAAAAAAAAAAAAAAAAAAAAAAAAAAAAAAAAAAAAAAAAAAAAAAAAAAAAAAAAAAAAAAAAAAAAAAAAAAAAAAAAAAAAAAAAAAAAAAAAAAAAAAAAAAAAAAAAAAAAAAAAAAAAAAAAAAAAAAAAAAAAAAAAAAAAAAAAAAAAAAAAAAAAAAAAAAAAAAAAAAAAAAAAAAAAAAAAAAAAAAAAAAAAAAAAAAAAAAAAAAAAAAAAAAAAAAAAAAAAAAAAAAAAAAAAAAAAAAAAAAAAAAAAAAAAAAAAAAAAAAAAAAAAAAAAAAAAAAAAAAAAAAAAAAAAAAAAAAAAAAAAAAAAAAAAAAAAAAAAAAAAAAAAAAAAAAAAAAAAAAAAAAAAAAAAAAAAAAAAAAAAAAAAAAAAAAAAAAAAAAAAAAAAAAAAAAAAAAAAAAAAAAAAAAAAAAAAAAAAAAAAAAAAAAAAAAAAAAAAAAAAAAAAAAAAAAAAAAAAAAAAAAAAAAAAAAAAAAAAAAAAAAAAAAAAAAAAAAAAAAAAAAAAAAAAAAAAAAAAAAAAAAAAAAAAAAAAAAAAAAAAAAAAAAAAAAAAAAAAAAAAAAAAAAAAAAAAAAAAAAAAAAAAAAAAAAAAAAAAAAAAAAAAAAAAAAAAAAAAAAAAAAAAAAAAAAAAAAAAAAAAAAAAAAAAAAAAAAAAAAAAAAAAAAAAAAAAAAAAAAAAAAAAAAAAAAAAAAAAAAAAAAAAAAAAAAAAAAAAAAAAAAAAAAAAAAAAAAAAAAAAAAAAAAAAAAAAAAAAAAAAAAAAAAAAAAAAAAAAAAAAAAAAAAAAAAAAAAAAAAAAAAAAAAAAAAAAAAAAAAAAAAAAAAAAAAAAAAAAAAAAAAAAAAAAAAAAAAAAAAAAAAAAAAAAAAAAAAAAAAAAAAAAAAAAAAAAAAAAAAAAAAAAAAAAAAAAAAAAAAAAAAAAAAAAAAAAAAAAAAAAAAAAAAAAAAAAAAAAAAAAAAAAAAAAAAAAAAAAAAAAAAAAAAAAAAAAAAAAAAAAAAAAAAAAAAAAAAAAAAAAAAAAAAAAAAAAAAAAAAAAAAAAAAAAAAAAAAAAAAAAAAAAAAAAAAAAAAAAAAAAAAAAAAAAAAAAAAAAAAAAAAAAAAAAAAAAAAAAAAAAAAAAAAAAAAAAAAAAAAAAAAAAAAAAAAAAAAAAAAAAAAAAAAAAAAAAAAAAAAAAAAAAAAAAAAAAAAAAAAAAAAAAAAAAAAAAAAAAAAAAAAAAAAAAAAAAAAAAAAAAAAAAAAAAAAAAAAAAAAAAAAAAAAAAAAAAAAAAAAAAAAAAAAAAAAAAAAAAAAAAAAAAAAAAAAAAAAAAAAAAAAAAAAAAAAAAAAAAAAAAAAAAAAAAAAAAAAAAAAAAAAAAAAAAAAAAAAAAAAAAAAAAAAAAAAAAAAAAAAAAAAAAAAAAAAAAAAAAAAAAAAAAAAAAAAAAAAAAAAAAAAAAAAAAAAAAAAAAAAAAAAAAAAAAAAAAAAAAAAAAAAAAAAAAAAAAAAAAAAAAAAAAAAAAAAAAAAAAAAAAAAAAAAAAAAAAAAAAAAAAAAAAAAAAAAAAAAAAAAAAAAAAAAAAAAAAAAAAAAAAAAAAAAAAAAAAAAAAAAAAAAAAAAAAAAAAAAAAAAAAAAAAAAAAAAAAAAAAAAAAAAAAAAAAAAAAAAAAAAAAAAAAAAAAAAAAAAAAAAAAAAAAAAAAAAAAAAAAAAAAAAAAAAAAAAAAAAAAAAAAAAAAAAAAAAAAAAAAAAAAAAAAAAAAAAAAAAAAAAAAAAAAAAAAAAAAAAAAAAAAAAAAAAAAAAAAAAAAAAAAAAAAAAAAAAAAAAAAAAAAAAAAAAAAAAAAAAAAAAAAAAAAAAAAAAAAAAAAAAAAAAAAAAAAAAAAAAAAAAAAAAAAAAAAAAAAAAAAAAAAAAAAAAAAAAAAAAAAAAAAAAAAAAAAAAAAAAAAAAAAAAAAAAAAAAAAAAAAAAAAAAAAAAAAAAAAAAAAAAAAAAAAAAAAAAAAAAAAAAAAAAAAAAAAAAAAAAAAAAAAAAAAAAAAAAAAAAAAAAAAAAAAAAAAAAAAAAAAAAAAAAAAAAAAAAAAAAAAAAAAAAAAAAAAAAAAAAAAAAAAAAAAAAAAAAAAAAAAAAAAAAAAAAAAAAAAAAAAAAAAAAAAAAAAAAAAAAAAAAAAAAAAAAAAAAAAAAAAAAAAAAAAAAAAAAAAAAAAAAAAAAAAAAAAAAAAAAAAAAAAAAAAAAAAAAAAAAAAAAAAAAAAAAAAAAAAAAAAAAAAAAAAAAAAAAAAAAAAAAAAAAAAAAAAAAAAAAAAAAAAAAAAAAAAAAAAAAAAAAAAAAAAAAAAAAAAAAAAAAAAAAAAAAAAAAAAAAAAAAAAAAAAAAAAAAAAAAAAAAAAAAAAAAAAAAAAAAAAAAAAAAAAAAAAAAAAAAAAAAAAAAAAAAAAAAAAAAAAAAAAAAAAAAAAAAAAAAAAAAAAAAAAAAAAAAAAAAAAAAAAAAAAAAAAAAAAAAAAAAAAAAAAAAAAAAAAAAAAAAAAAAAAAAAAAAAAAAAAAAAAAAAAAAAAAAAAAAAAAAAAAAAAAAAAAAAAAAAAAAAAAAAAAAAAAAAAAAAAAAAAAAAAAAAAAAAAAAAAAAAAAAAAAAAAAAAAAAAAAAAAAAAAAAAAAAAAAAAAAAAAAAAAAAAAAAAAAAAAAAAAAAAAAAAAAAAAAAAAAAAAAAAAAAAAAAAAAAAAAAAAAAAAAAAAAAAAAAAAAAAAAAAAAAAAAAAAAAAAAAAAAAAAAAAAAAAAAAAAAAAAAAAAAAAAAAAAAAAAAAAAAAAAAAAAAAAAAAAAAAAAAAAAAAAAAAAAAAAAAAAAAAAAAAAAAAAAAAAAAAAAAAAAAAAAAAAAAAAAAAAAAAAAAAAAAAAAAAAAAAAAAAAAAAAAAAAAAAAAAAAAAAAAAAAAAAAAAAAAAAAAAAAAAAAAAAAAAAAAAAAAAAAAAAAAAAAAAAAAAAAAAAAAAAAAAAAAAAAAAAAAAAAAAAAAAAAAAAAAAAAAAAAAAAAAAAAAAAAAAAAAAAAAAAAAAAAAAAAAAAAAAAAAAAAAAAAAAAAAAAAAAAAAAAAAAAAAAAAAAAAAAAAAAAAAAAAAAAAAAAAAAAAAAAAAAAAAAAAAAAAAAAAAAAAAAAAAAAAAAAAAAAAAAAAAAAAAAAAAAAAAAAAAAAAAAAAAAAAAAAAAAAAAAAAAAAAAAAAAAAAAAAAAAAAAAAAAAAAAAAAAAAAAAAAAAAAAAAAAAAAAAAAAAAAAAAAAAAAAAAAAAAAAAAAAAAAAAAAAAAAAAAAAAAAAAAAAAAAAAAAAAAAAAAAAAAAAAAAAAAAAAAAAAAAAAAAAAAAAAAAAAAAAAAAAAAAAAAAAAAAAAAAAAAAAAAAAAAAAAAAAAAAAAAAAAAAAAAAAAAAAAAAAAAAAAAAAAA"/>

</xml_diff>

<commit_message>
files reorg, naming funct, cultures map
</commit_message>
<xml_diff>
--- a/docu/00_concept.pptx
+++ b/docu/00_concept.pptx
@@ -5,13 +5,12 @@
     <p:sldMasterId id="2147483648" r:id="rId1"/>
   </p:sldMasterIdLst>
   <p:sldIdLst>
-    <p:sldId id="257" r:id="rId2"/>
-    <p:sldId id="258" r:id="rId3"/>
+    <p:sldId id="258" r:id="rId2"/>
   </p:sldIdLst>
   <p:sldSz cx="12192000" cy="6858000"/>
   <p:notesSz cx="6858000" cy="9144000"/>
   <p:custDataLst>
-    <p:tags r:id="rId4"/>
+    <p:tags r:id="rId3"/>
   </p:custDataLst>
   <p:defaultTextStyle>
     <a:defPPr>
@@ -111,11 +110,6 @@
   <p:extLst>
     <p:ext uri="{521415D9-36F7-43E2-AB2F-B90AF26B5E84}">
       <p14:sectionLst xmlns:p14="http://schemas.microsoft.com/office/powerpoint/2010/main">
-        <p14:section name="old" id="{B6F56A15-EC68-4FDB-A748-2AB4884B8A79}">
-          <p14:sldIdLst>
-            <p14:sldId id="257"/>
-          </p14:sldIdLst>
-        </p14:section>
         <p14:section name="imperator" id="{526B28B9-53ED-413B-9B68-FC2009F7BD37}">
           <p14:sldIdLst>
             <p14:sldId id="258"/>
@@ -390,7 +384,7 @@
           <a:p>
             <a:fld id="{AA785629-72FB-4BD8-A888-872F3B8BC806}" type="datetimeFigureOut">
               <a:rPr lang="en-DE" smtClean="0"/>
-              <a:t>23/01/2024</a:t>
+              <a:t>24/01/2024</a:t>
             </a:fld>
             <a:endParaRPr lang="en-DE"/>
           </a:p>
@@ -444,7 +438,7 @@
           <a:p>
             <a:fld id="{AD573DC3-912A-4ACD-B401-DCDCB70EF517}" type="slidenum">
               <a:rPr lang="en-DE" smtClean="0"/>
-              <a:t>‹Nr.›</a:t>
+              <a:t>‹#›</a:t>
             </a:fld>
             <a:endParaRPr lang="en-DE"/>
           </a:p>
@@ -590,7 +584,7 @@
           <a:p>
             <a:fld id="{AA785629-72FB-4BD8-A888-872F3B8BC806}" type="datetimeFigureOut">
               <a:rPr lang="en-DE" smtClean="0"/>
-              <a:t>23/01/2024</a:t>
+              <a:t>24/01/2024</a:t>
             </a:fld>
             <a:endParaRPr lang="en-DE"/>
           </a:p>
@@ -644,7 +638,7 @@
           <a:p>
             <a:fld id="{AD573DC3-912A-4ACD-B401-DCDCB70EF517}" type="slidenum">
               <a:rPr lang="en-DE" smtClean="0"/>
-              <a:t>‹Nr.›</a:t>
+              <a:t>‹#›</a:t>
             </a:fld>
             <a:endParaRPr lang="en-DE"/>
           </a:p>
@@ -800,7 +794,7 @@
           <a:p>
             <a:fld id="{AA785629-72FB-4BD8-A888-872F3B8BC806}" type="datetimeFigureOut">
               <a:rPr lang="en-DE" smtClean="0"/>
-              <a:t>23/01/2024</a:t>
+              <a:t>24/01/2024</a:t>
             </a:fld>
             <a:endParaRPr lang="en-DE"/>
           </a:p>
@@ -854,7 +848,7 @@
           <a:p>
             <a:fld id="{AD573DC3-912A-4ACD-B401-DCDCB70EF517}" type="slidenum">
               <a:rPr lang="en-DE" smtClean="0"/>
-              <a:t>‹Nr.›</a:t>
+              <a:t>‹#›</a:t>
             </a:fld>
             <a:endParaRPr lang="en-DE"/>
           </a:p>
@@ -1000,7 +994,7 @@
           <a:p>
             <a:fld id="{AA785629-72FB-4BD8-A888-872F3B8BC806}" type="datetimeFigureOut">
               <a:rPr lang="en-DE" smtClean="0"/>
-              <a:t>23/01/2024</a:t>
+              <a:t>24/01/2024</a:t>
             </a:fld>
             <a:endParaRPr lang="en-DE"/>
           </a:p>
@@ -1054,7 +1048,7 @@
           <a:p>
             <a:fld id="{AD573DC3-912A-4ACD-B401-DCDCB70EF517}" type="slidenum">
               <a:rPr lang="en-DE" smtClean="0"/>
-              <a:t>‹Nr.›</a:t>
+              <a:t>‹#›</a:t>
             </a:fld>
             <a:endParaRPr lang="en-DE"/>
           </a:p>
@@ -1276,7 +1270,7 @@
           <a:p>
             <a:fld id="{AA785629-72FB-4BD8-A888-872F3B8BC806}" type="datetimeFigureOut">
               <a:rPr lang="en-DE" smtClean="0"/>
-              <a:t>23/01/2024</a:t>
+              <a:t>24/01/2024</a:t>
             </a:fld>
             <a:endParaRPr lang="en-DE"/>
           </a:p>
@@ -1330,7 +1324,7 @@
           <a:p>
             <a:fld id="{AD573DC3-912A-4ACD-B401-DCDCB70EF517}" type="slidenum">
               <a:rPr lang="en-DE" smtClean="0"/>
-              <a:t>‹Nr.›</a:t>
+              <a:t>‹#›</a:t>
             </a:fld>
             <a:endParaRPr lang="en-DE"/>
           </a:p>
@@ -1544,7 +1538,7 @@
           <a:p>
             <a:fld id="{AA785629-72FB-4BD8-A888-872F3B8BC806}" type="datetimeFigureOut">
               <a:rPr lang="en-DE" smtClean="0"/>
-              <a:t>23/01/2024</a:t>
+              <a:t>24/01/2024</a:t>
             </a:fld>
             <a:endParaRPr lang="en-DE"/>
           </a:p>
@@ -1598,7 +1592,7 @@
           <a:p>
             <a:fld id="{AD573DC3-912A-4ACD-B401-DCDCB70EF517}" type="slidenum">
               <a:rPr lang="en-DE" smtClean="0"/>
-              <a:t>‹Nr.›</a:t>
+              <a:t>‹#›</a:t>
             </a:fld>
             <a:endParaRPr lang="en-DE"/>
           </a:p>
@@ -1959,7 +1953,7 @@
           <a:p>
             <a:fld id="{AA785629-72FB-4BD8-A888-872F3B8BC806}" type="datetimeFigureOut">
               <a:rPr lang="en-DE" smtClean="0"/>
-              <a:t>23/01/2024</a:t>
+              <a:t>24/01/2024</a:t>
             </a:fld>
             <a:endParaRPr lang="en-DE"/>
           </a:p>
@@ -2013,7 +2007,7 @@
           <a:p>
             <a:fld id="{AD573DC3-912A-4ACD-B401-DCDCB70EF517}" type="slidenum">
               <a:rPr lang="en-DE" smtClean="0"/>
-              <a:t>‹Nr.›</a:t>
+              <a:t>‹#›</a:t>
             </a:fld>
             <a:endParaRPr lang="en-DE"/>
           </a:p>
@@ -2101,7 +2095,7 @@
           <a:p>
             <a:fld id="{AA785629-72FB-4BD8-A888-872F3B8BC806}" type="datetimeFigureOut">
               <a:rPr lang="en-DE" smtClean="0"/>
-              <a:t>23/01/2024</a:t>
+              <a:t>24/01/2024</a:t>
             </a:fld>
             <a:endParaRPr lang="en-DE"/>
           </a:p>
@@ -2155,7 +2149,7 @@
           <a:p>
             <a:fld id="{AD573DC3-912A-4ACD-B401-DCDCB70EF517}" type="slidenum">
               <a:rPr lang="en-DE" smtClean="0"/>
-              <a:t>‹Nr.›</a:t>
+              <a:t>‹#›</a:t>
             </a:fld>
             <a:endParaRPr lang="en-DE"/>
           </a:p>
@@ -2214,7 +2208,7 @@
           <a:p>
             <a:fld id="{AA785629-72FB-4BD8-A888-872F3B8BC806}" type="datetimeFigureOut">
               <a:rPr lang="en-DE" smtClean="0"/>
-              <a:t>23/01/2024</a:t>
+              <a:t>24/01/2024</a:t>
             </a:fld>
             <a:endParaRPr lang="en-DE"/>
           </a:p>
@@ -2268,7 +2262,7 @@
           <a:p>
             <a:fld id="{AD573DC3-912A-4ACD-B401-DCDCB70EF517}" type="slidenum">
               <a:rPr lang="en-DE" smtClean="0"/>
-              <a:t>‹Nr.›</a:t>
+              <a:t>‹#›</a:t>
             </a:fld>
             <a:endParaRPr lang="en-DE"/>
           </a:p>
@@ -2527,7 +2521,7 @@
           <a:p>
             <a:fld id="{AA785629-72FB-4BD8-A888-872F3B8BC806}" type="datetimeFigureOut">
               <a:rPr lang="en-DE" smtClean="0"/>
-              <a:t>23/01/2024</a:t>
+              <a:t>24/01/2024</a:t>
             </a:fld>
             <a:endParaRPr lang="en-DE"/>
           </a:p>
@@ -2581,7 +2575,7 @@
           <a:p>
             <a:fld id="{AD573DC3-912A-4ACD-B401-DCDCB70EF517}" type="slidenum">
               <a:rPr lang="en-DE" smtClean="0"/>
-              <a:t>‹Nr.›</a:t>
+              <a:t>‹#›</a:t>
             </a:fld>
             <a:endParaRPr lang="en-DE"/>
           </a:p>
@@ -2816,7 +2810,7 @@
           <a:p>
             <a:fld id="{AA785629-72FB-4BD8-A888-872F3B8BC806}" type="datetimeFigureOut">
               <a:rPr lang="en-DE" smtClean="0"/>
-              <a:t>23/01/2024</a:t>
+              <a:t>24/01/2024</a:t>
             </a:fld>
             <a:endParaRPr lang="en-DE"/>
           </a:p>
@@ -2870,7 +2864,7 @@
           <a:p>
             <a:fld id="{AD573DC3-912A-4ACD-B401-DCDCB70EF517}" type="slidenum">
               <a:rPr lang="en-DE" smtClean="0"/>
-              <a:t>‹Nr.›</a:t>
+              <a:t>‹#›</a:t>
             </a:fld>
             <a:endParaRPr lang="en-DE"/>
           </a:p>
@@ -3059,7 +3053,7 @@
           <a:p>
             <a:fld id="{AA785629-72FB-4BD8-A888-872F3B8BC806}" type="datetimeFigureOut">
               <a:rPr lang="en-DE" smtClean="0"/>
-              <a:t>23/01/2024</a:t>
+              <a:t>24/01/2024</a:t>
             </a:fld>
             <a:endParaRPr lang="en-DE"/>
           </a:p>
@@ -3149,7 +3143,7 @@
           <a:p>
             <a:fld id="{AD573DC3-912A-4ACD-B401-DCDCB70EF517}" type="slidenum">
               <a:rPr lang="en-DE" smtClean="0"/>
-              <a:t>‹Nr.›</a:t>
+              <a:t>‹#›</a:t>
             </a:fld>
             <a:endParaRPr lang="en-DE"/>
           </a:p>
@@ -3478,458 +3472,6 @@
       </p:grpSpPr>
       <p:sp>
         <p:nvSpPr>
-          <p:cNvPr id="4" name="Flowchart: Internal Storage 3">
-            <a:extLst>
-              <a:ext uri="{FF2B5EF4-FFF2-40B4-BE49-F238E27FC236}">
-                <a16:creationId xmlns:a16="http://schemas.microsoft.com/office/drawing/2014/main" id="{FC75CA5C-668A-4874-87F9-E7C5214906B0}"/>
-              </a:ext>
-            </a:extLst>
-          </p:cNvPr>
-          <p:cNvSpPr/>
-          <p:nvPr/>
-        </p:nvSpPr>
-        <p:spPr>
-          <a:xfrm>
-            <a:off x="3293654" y="643855"/>
-            <a:ext cx="2550253" cy="2785145"/>
-          </a:xfrm>
-          <a:prstGeom prst="flowChartInternalStorage">
-            <a:avLst/>
-          </a:prstGeom>
-        </p:spPr>
-        <p:style>
-          <a:lnRef idx="2">
-            <a:schemeClr val="accent1">
-              <a:shade val="50000"/>
-            </a:schemeClr>
-          </a:lnRef>
-          <a:fillRef idx="1">
-            <a:schemeClr val="accent1"/>
-          </a:fillRef>
-          <a:effectRef idx="0">
-            <a:schemeClr val="accent1"/>
-          </a:effectRef>
-          <a:fontRef idx="minor">
-            <a:schemeClr val="lt1"/>
-          </a:fontRef>
-        </p:style>
-        <p:txBody>
-          <a:bodyPr lIns="0" tIns="0" rtlCol="0" anchor="t" anchorCtr="0"/>
-          <a:lstStyle/>
-          <a:p>
-            <a:pPr algn="ctr"/>
-            <a:r>
-              <a:rPr lang="en-DE" dirty="0"/>
-              <a:t>parser.py</a:t>
-            </a:r>
-          </a:p>
-          <a:p>
-            <a:pPr marL="285750" indent="-285750" algn="ctr">
-              <a:buFont typeface="Arial" panose="020B0604020202020204" pitchFamily="34" charset="0"/>
-              <a:buChar char="•"/>
-            </a:pPr>
-            <a:r>
-              <a:rPr lang="de-DE" dirty="0"/>
-              <a:t>L</a:t>
-            </a:r>
-            <a:r>
-              <a:rPr lang="en-DE" dirty="0" err="1"/>
-              <a:t>oad</a:t>
-            </a:r>
-            <a:r>
-              <a:rPr lang="en-DE" dirty="0"/>
-              <a:t> file</a:t>
-            </a:r>
-          </a:p>
-          <a:p>
-            <a:pPr marL="285750" indent="-285750" algn="ctr">
-              <a:buFont typeface="Arial" panose="020B0604020202020204" pitchFamily="34" charset="0"/>
-              <a:buChar char="•"/>
-            </a:pPr>
-            <a:r>
-              <a:rPr lang="de-DE" dirty="0"/>
-              <a:t>L</a:t>
-            </a:r>
-            <a:r>
-              <a:rPr lang="en-DE" dirty="0" err="1"/>
-              <a:t>ist</a:t>
-            </a:r>
-            <a:r>
-              <a:rPr lang="en-DE" dirty="0"/>
-              <a:t> objects instances and properties</a:t>
-            </a:r>
-          </a:p>
-        </p:txBody>
-      </p:sp>
-      <p:sp>
-        <p:nvSpPr>
-          <p:cNvPr id="5" name="Flowchart: Magnetic Disk 4">
-            <a:extLst>
-              <a:ext uri="{FF2B5EF4-FFF2-40B4-BE49-F238E27FC236}">
-                <a16:creationId xmlns:a16="http://schemas.microsoft.com/office/drawing/2014/main" id="{F9681DAF-BEBA-4541-A827-9EC09BA78C86}"/>
-              </a:ext>
-            </a:extLst>
-          </p:cNvPr>
-          <p:cNvSpPr/>
-          <p:nvPr/>
-        </p:nvSpPr>
-        <p:spPr>
-          <a:xfrm>
-            <a:off x="587229" y="830510"/>
-            <a:ext cx="1333850" cy="1065402"/>
-          </a:xfrm>
-          <a:prstGeom prst="flowChartMagneticDisk">
-            <a:avLst/>
-          </a:prstGeom>
-        </p:spPr>
-        <p:style>
-          <a:lnRef idx="2">
-            <a:schemeClr val="accent1">
-              <a:shade val="50000"/>
-            </a:schemeClr>
-          </a:lnRef>
-          <a:fillRef idx="1">
-            <a:schemeClr val="accent1"/>
-          </a:fillRef>
-          <a:effectRef idx="0">
-            <a:schemeClr val="accent1"/>
-          </a:effectRef>
-          <a:fontRef idx="minor">
-            <a:schemeClr val="lt1"/>
-          </a:fontRef>
-        </p:style>
-        <p:txBody>
-          <a:bodyPr rtlCol="0" anchor="ctr"/>
-          <a:lstStyle/>
-          <a:p>
-            <a:pPr algn="ctr"/>
-            <a:r>
-              <a:rPr lang="en-DE" sz="1400" dirty="0"/>
-              <a:t>dictionaries.py</a:t>
-            </a:r>
-          </a:p>
-        </p:txBody>
-      </p:sp>
-      <p:sp>
-        <p:nvSpPr>
-          <p:cNvPr id="6" name="Flowchart: Magnetic Disk 5">
-            <a:extLst>
-              <a:ext uri="{FF2B5EF4-FFF2-40B4-BE49-F238E27FC236}">
-                <a16:creationId xmlns:a16="http://schemas.microsoft.com/office/drawing/2014/main" id="{86C5DE13-3B73-4477-A51E-9CDCEB8300B1}"/>
-              </a:ext>
-            </a:extLst>
-          </p:cNvPr>
-          <p:cNvSpPr/>
-          <p:nvPr/>
-        </p:nvSpPr>
-        <p:spPr>
-          <a:xfrm>
-            <a:off x="647350" y="2141989"/>
-            <a:ext cx="1333850" cy="1065402"/>
-          </a:xfrm>
-          <a:prstGeom prst="flowChartMagneticDisk">
-            <a:avLst/>
-          </a:prstGeom>
-        </p:spPr>
-        <p:style>
-          <a:lnRef idx="2">
-            <a:schemeClr val="accent1">
-              <a:shade val="50000"/>
-            </a:schemeClr>
-          </a:lnRef>
-          <a:fillRef idx="1">
-            <a:schemeClr val="accent1"/>
-          </a:fillRef>
-          <a:effectRef idx="0">
-            <a:schemeClr val="accent1"/>
-          </a:effectRef>
-          <a:fontRef idx="minor">
-            <a:schemeClr val="lt1"/>
-          </a:fontRef>
-        </p:style>
-        <p:txBody>
-          <a:bodyPr rtlCol="0" anchor="ctr"/>
-          <a:lstStyle/>
-          <a:p>
-            <a:pPr algn="ctr"/>
-            <a:r>
-              <a:rPr lang="en-DE" sz="1400" dirty="0"/>
-              <a:t>functions.py</a:t>
-            </a:r>
-          </a:p>
-        </p:txBody>
-      </p:sp>
-      <p:cxnSp>
-        <p:nvCxnSpPr>
-          <p:cNvPr id="8" name="Straight Arrow Connector 7">
-            <a:extLst>
-              <a:ext uri="{FF2B5EF4-FFF2-40B4-BE49-F238E27FC236}">
-                <a16:creationId xmlns:a16="http://schemas.microsoft.com/office/drawing/2014/main" id="{7CA1D424-7BC7-4325-AC0C-34DF300B7B56}"/>
-              </a:ext>
-            </a:extLst>
-          </p:cNvPr>
-          <p:cNvCxnSpPr>
-            <a:stCxn id="5" idx="4"/>
-            <a:endCxn id="4" idx="1"/>
-          </p:cNvCxnSpPr>
-          <p:nvPr/>
-        </p:nvCxnSpPr>
-        <p:spPr>
-          <a:xfrm>
-            <a:off x="1921079" y="1363211"/>
-            <a:ext cx="1372575" cy="673217"/>
-          </a:xfrm>
-          <a:prstGeom prst="straightConnector1">
-            <a:avLst/>
-          </a:prstGeom>
-          <a:ln>
-            <a:tailEnd type="triangle"/>
-          </a:ln>
-        </p:spPr>
-        <p:style>
-          <a:lnRef idx="1">
-            <a:schemeClr val="accent1"/>
-          </a:lnRef>
-          <a:fillRef idx="0">
-            <a:schemeClr val="accent1"/>
-          </a:fillRef>
-          <a:effectRef idx="0">
-            <a:schemeClr val="accent1"/>
-          </a:effectRef>
-          <a:fontRef idx="minor">
-            <a:schemeClr val="tx1"/>
-          </a:fontRef>
-        </p:style>
-      </p:cxnSp>
-      <p:cxnSp>
-        <p:nvCxnSpPr>
-          <p:cNvPr id="9" name="Straight Arrow Connector 8">
-            <a:extLst>
-              <a:ext uri="{FF2B5EF4-FFF2-40B4-BE49-F238E27FC236}">
-                <a16:creationId xmlns:a16="http://schemas.microsoft.com/office/drawing/2014/main" id="{73EE0F37-DDA4-47AE-8296-58E18DA34582}"/>
-              </a:ext>
-            </a:extLst>
-          </p:cNvPr>
-          <p:cNvCxnSpPr>
-            <a:cxnSpLocks/>
-            <a:stCxn id="6" idx="4"/>
-            <a:endCxn id="4" idx="1"/>
-          </p:cNvCxnSpPr>
-          <p:nvPr/>
-        </p:nvCxnSpPr>
-        <p:spPr>
-          <a:xfrm flipV="1">
-            <a:off x="1981200" y="2036428"/>
-            <a:ext cx="1312454" cy="638262"/>
-          </a:xfrm>
-          <a:prstGeom prst="straightConnector1">
-            <a:avLst/>
-          </a:prstGeom>
-          <a:ln>
-            <a:tailEnd type="triangle"/>
-          </a:ln>
-        </p:spPr>
-        <p:style>
-          <a:lnRef idx="1">
-            <a:schemeClr val="accent1"/>
-          </a:lnRef>
-          <a:fillRef idx="0">
-            <a:schemeClr val="accent1"/>
-          </a:fillRef>
-          <a:effectRef idx="0">
-            <a:schemeClr val="accent1"/>
-          </a:effectRef>
-          <a:fontRef idx="minor">
-            <a:schemeClr val="tx1"/>
-          </a:fontRef>
-        </p:style>
-      </p:cxnSp>
-      <p:sp>
-        <p:nvSpPr>
-          <p:cNvPr id="14" name="Flowchart: Internal Storage 13">
-            <a:extLst>
-              <a:ext uri="{FF2B5EF4-FFF2-40B4-BE49-F238E27FC236}">
-                <a16:creationId xmlns:a16="http://schemas.microsoft.com/office/drawing/2014/main" id="{59EB63FC-928E-4090-926E-2E2514EE1803}"/>
-              </a:ext>
-            </a:extLst>
-          </p:cNvPr>
-          <p:cNvSpPr/>
-          <p:nvPr/>
-        </p:nvSpPr>
-        <p:spPr>
-          <a:xfrm>
-            <a:off x="6881981" y="643855"/>
-            <a:ext cx="2550253" cy="2785145"/>
-          </a:xfrm>
-          <a:prstGeom prst="flowChartInternalStorage">
-            <a:avLst/>
-          </a:prstGeom>
-        </p:spPr>
-        <p:style>
-          <a:lnRef idx="2">
-            <a:schemeClr val="accent1">
-              <a:shade val="50000"/>
-            </a:schemeClr>
-          </a:lnRef>
-          <a:fillRef idx="1">
-            <a:schemeClr val="accent1"/>
-          </a:fillRef>
-          <a:effectRef idx="0">
-            <a:schemeClr val="accent1"/>
-          </a:effectRef>
-          <a:fontRef idx="minor">
-            <a:schemeClr val="lt1"/>
-          </a:fontRef>
-        </p:style>
-        <p:txBody>
-          <a:bodyPr lIns="0" tIns="0" rtlCol="0" anchor="t" anchorCtr="0"/>
-          <a:lstStyle>
-            <a:lvl1pPr>
-              <a:buFont typeface="Arial" panose="020B0604020202020204" pitchFamily="34" charset="0"/>
-              <a:buChar char="•"/>
-            </a:lvl1pPr>
-            <a:lvl2pPr>
-              <a:buFont typeface="Arial" panose="020B0604020202020204" pitchFamily="34" charset="0"/>
-              <a:buChar char="•"/>
-            </a:lvl2pPr>
-            <a:lvl3pPr>
-              <a:buFont typeface="Arial" panose="020B0604020202020204" pitchFamily="34" charset="0"/>
-              <a:buChar char="•"/>
-            </a:lvl3pPr>
-            <a:lvl4pPr>
-              <a:buFont typeface="Arial" panose="020B0604020202020204" pitchFamily="34" charset="0"/>
-              <a:buChar char="•"/>
-            </a:lvl4pPr>
-            <a:lvl5pPr>
-              <a:buFont typeface="Arial" panose="020B0604020202020204" pitchFamily="34" charset="0"/>
-              <a:buChar char="•"/>
-            </a:lvl5pPr>
-            <a:lvl6pPr>
-              <a:buFont typeface="Arial" panose="020B0604020202020204" pitchFamily="34" charset="0"/>
-              <a:buChar char="•"/>
-            </a:lvl6pPr>
-            <a:lvl7pPr>
-              <a:buFont typeface="Arial" panose="020B0604020202020204" pitchFamily="34" charset="0"/>
-              <a:buChar char="•"/>
-            </a:lvl7pPr>
-            <a:lvl8pPr>
-              <a:buFont typeface="Arial" panose="020B0604020202020204" pitchFamily="34" charset="0"/>
-              <a:buChar char="•"/>
-            </a:lvl8pPr>
-            <a:lvl9pPr>
-              <a:buFont typeface="Arial" panose="020B0604020202020204" pitchFamily="34" charset="0"/>
-              <a:buChar char="•"/>
-            </a:lvl9pPr>
-          </a:lstStyle>
-          <a:p>
-            <a:pPr algn="ctr">
-              <a:buNone/>
-            </a:pPr>
-            <a:r>
-              <a:rPr lang="de-DE" dirty="0"/>
-              <a:t>O</a:t>
-            </a:r>
-            <a:r>
-              <a:rPr lang="en-DE" dirty="0"/>
-              <a:t>utput.py</a:t>
-            </a:r>
-          </a:p>
-          <a:p>
-            <a:pPr marL="285750" indent="-285750" algn="ctr"/>
-            <a:r>
-              <a:rPr lang="de-DE" dirty="0"/>
-              <a:t>P</a:t>
-            </a:r>
-            <a:r>
-              <a:rPr lang="en-DE" dirty="0" err="1"/>
-              <a:t>repare</a:t>
-            </a:r>
-            <a:r>
-              <a:rPr lang="en-DE" dirty="0"/>
-              <a:t> one CSV per object type</a:t>
-            </a:r>
-          </a:p>
-          <a:p>
-            <a:pPr marL="285750" indent="-285750" algn="ctr"/>
-            <a:endParaRPr lang="en-DE" dirty="0"/>
-          </a:p>
-        </p:txBody>
-      </p:sp>
-      <p:sp>
-        <p:nvSpPr>
-          <p:cNvPr id="2" name="TextBox 1">
-            <a:extLst>
-              <a:ext uri="{FF2B5EF4-FFF2-40B4-BE49-F238E27FC236}">
-                <a16:creationId xmlns:a16="http://schemas.microsoft.com/office/drawing/2014/main" id="{E0188C7F-47D0-4933-B0E9-D57E25CC393B}"/>
-              </a:ext>
-            </a:extLst>
-          </p:cNvPr>
-          <p:cNvSpPr txBox="1"/>
-          <p:nvPr/>
-        </p:nvSpPr>
-        <p:spPr>
-          <a:xfrm>
-            <a:off x="1126836" y="4636655"/>
-            <a:ext cx="6400800" cy="369332"/>
-          </a:xfrm>
-          <a:prstGeom prst="rect">
-            <a:avLst/>
-          </a:prstGeom>
-          <a:noFill/>
-        </p:spPr>
-        <p:txBody>
-          <a:bodyPr wrap="square" rtlCol="0">
-            <a:spAutoFit/>
-          </a:bodyPr>
-          <a:lstStyle/>
-          <a:p>
-            <a:r>
-              <a:rPr lang="de-DE" dirty="0"/>
-              <a:t>T</a:t>
-            </a:r>
-            <a:r>
-              <a:rPr lang="en-DE" dirty="0" err="1"/>
-              <a:t>odos</a:t>
-            </a:r>
-            <a:r>
-              <a:rPr lang="en-DE" dirty="0"/>
-              <a:t>:</a:t>
-            </a:r>
-          </a:p>
-        </p:txBody>
-      </p:sp>
-    </p:spTree>
-    <p:extLst>
-      <p:ext uri="{BB962C8B-B14F-4D97-AF65-F5344CB8AC3E}">
-        <p14:creationId xmlns:p14="http://schemas.microsoft.com/office/powerpoint/2010/main" val="1099219634"/>
-      </p:ext>
-    </p:extLst>
-  </p:cSld>
-  <p:clrMapOvr>
-    <a:masterClrMapping/>
-  </p:clrMapOvr>
-</p:sld>
-</file>
-
-<file path=ppt/slides/slide2.xml><?xml version="1.0" encoding="utf-8"?>
-<p:sld xmlns:a="http://schemas.openxmlformats.org/drawingml/2006/main" xmlns:r="http://schemas.openxmlformats.org/officeDocument/2006/relationships" xmlns:p="http://schemas.openxmlformats.org/presentationml/2006/main">
-  <p:cSld>
-    <p:spTree>
-      <p:nvGrpSpPr>
-        <p:cNvPr id="1" name=""/>
-        <p:cNvGrpSpPr/>
-        <p:nvPr/>
-      </p:nvGrpSpPr>
-      <p:grpSpPr>
-        <a:xfrm>
-          <a:off x="0" y="0"/>
-          <a:ext cx="0" cy="0"/>
-          <a:chOff x="0" y="0"/>
-          <a:chExt cx="0" cy="0"/>
-        </a:xfrm>
-      </p:grpSpPr>
-      <p:sp>
-        <p:nvSpPr>
           <p:cNvPr id="9" name="Rechteck 8">
             <a:extLst>
               <a:ext uri="{FF2B5EF4-FFF2-40B4-BE49-F238E27FC236}">
@@ -4312,7 +3854,7 @@
         <p:spPr>
           <a:xfrm>
             <a:off x="4352794" y="5264190"/>
-            <a:ext cx="1922746" cy="830997"/>
+            <a:ext cx="1922746" cy="1015663"/>
           </a:xfrm>
           <a:prstGeom prst="rect">
             <a:avLst/>
@@ -4390,8 +3932,15 @@
             </a:pPr>
             <a:r>
               <a:rPr lang="en-DE" sz="1200" dirty="0"/>
-              <a:t>Cultures</a:t>
-            </a:r>
+              <a:t> Cultures✅</a:t>
+            </a:r>
+          </a:p>
+          <a:p>
+            <a:pPr marL="285750" indent="-285750">
+              <a:buFont typeface="Arial" panose="020B0604020202020204" pitchFamily="34" charset="0"/>
+              <a:buChar char="•"/>
+            </a:pPr>
+            <a:endParaRPr lang="en-DE" sz="1200" dirty="0"/>
           </a:p>
         </p:txBody>
       </p:sp>

</xml_diff>

<commit_message>
way too many different changes
</commit_message>
<xml_diff>
--- a/docu/00_concept.pptx
+++ b/docu/00_concept.pptx
@@ -384,7 +384,7 @@
           <a:p>
             <a:fld id="{AA785629-72FB-4BD8-A888-872F3B8BC806}" type="datetimeFigureOut">
               <a:rPr lang="en-DE" smtClean="0"/>
-              <a:t>24/01/2024</a:t>
+              <a:t>25/01/2024</a:t>
             </a:fld>
             <a:endParaRPr lang="en-DE"/>
           </a:p>
@@ -584,7 +584,7 @@
           <a:p>
             <a:fld id="{AA785629-72FB-4BD8-A888-872F3B8BC806}" type="datetimeFigureOut">
               <a:rPr lang="en-DE" smtClean="0"/>
-              <a:t>24/01/2024</a:t>
+              <a:t>25/01/2024</a:t>
             </a:fld>
             <a:endParaRPr lang="en-DE"/>
           </a:p>
@@ -794,7 +794,7 @@
           <a:p>
             <a:fld id="{AA785629-72FB-4BD8-A888-872F3B8BC806}" type="datetimeFigureOut">
               <a:rPr lang="en-DE" smtClean="0"/>
-              <a:t>24/01/2024</a:t>
+              <a:t>25/01/2024</a:t>
             </a:fld>
             <a:endParaRPr lang="en-DE"/>
           </a:p>
@@ -994,7 +994,7 @@
           <a:p>
             <a:fld id="{AA785629-72FB-4BD8-A888-872F3B8BC806}" type="datetimeFigureOut">
               <a:rPr lang="en-DE" smtClean="0"/>
-              <a:t>24/01/2024</a:t>
+              <a:t>25/01/2024</a:t>
             </a:fld>
             <a:endParaRPr lang="en-DE"/>
           </a:p>
@@ -1270,7 +1270,7 @@
           <a:p>
             <a:fld id="{AA785629-72FB-4BD8-A888-872F3B8BC806}" type="datetimeFigureOut">
               <a:rPr lang="en-DE" smtClean="0"/>
-              <a:t>24/01/2024</a:t>
+              <a:t>25/01/2024</a:t>
             </a:fld>
             <a:endParaRPr lang="en-DE"/>
           </a:p>
@@ -1538,7 +1538,7 @@
           <a:p>
             <a:fld id="{AA785629-72FB-4BD8-A888-872F3B8BC806}" type="datetimeFigureOut">
               <a:rPr lang="en-DE" smtClean="0"/>
-              <a:t>24/01/2024</a:t>
+              <a:t>25/01/2024</a:t>
             </a:fld>
             <a:endParaRPr lang="en-DE"/>
           </a:p>
@@ -1953,7 +1953,7 @@
           <a:p>
             <a:fld id="{AA785629-72FB-4BD8-A888-872F3B8BC806}" type="datetimeFigureOut">
               <a:rPr lang="en-DE" smtClean="0"/>
-              <a:t>24/01/2024</a:t>
+              <a:t>25/01/2024</a:t>
             </a:fld>
             <a:endParaRPr lang="en-DE"/>
           </a:p>
@@ -2095,7 +2095,7 @@
           <a:p>
             <a:fld id="{AA785629-72FB-4BD8-A888-872F3B8BC806}" type="datetimeFigureOut">
               <a:rPr lang="en-DE" smtClean="0"/>
-              <a:t>24/01/2024</a:t>
+              <a:t>25/01/2024</a:t>
             </a:fld>
             <a:endParaRPr lang="en-DE"/>
           </a:p>
@@ -2208,7 +2208,7 @@
           <a:p>
             <a:fld id="{AA785629-72FB-4BD8-A888-872F3B8BC806}" type="datetimeFigureOut">
               <a:rPr lang="en-DE" smtClean="0"/>
-              <a:t>24/01/2024</a:t>
+              <a:t>25/01/2024</a:t>
             </a:fld>
             <a:endParaRPr lang="en-DE"/>
           </a:p>
@@ -2521,7 +2521,7 @@
           <a:p>
             <a:fld id="{AA785629-72FB-4BD8-A888-872F3B8BC806}" type="datetimeFigureOut">
               <a:rPr lang="en-DE" smtClean="0"/>
-              <a:t>24/01/2024</a:t>
+              <a:t>25/01/2024</a:t>
             </a:fld>
             <a:endParaRPr lang="en-DE"/>
           </a:p>
@@ -2810,7 +2810,7 @@
           <a:p>
             <a:fld id="{AA785629-72FB-4BD8-A888-872F3B8BC806}" type="datetimeFigureOut">
               <a:rPr lang="en-DE" smtClean="0"/>
-              <a:t>24/01/2024</a:t>
+              <a:t>25/01/2024</a:t>
             </a:fld>
             <a:endParaRPr lang="en-DE"/>
           </a:p>
@@ -3053,7 +3053,7 @@
           <a:p>
             <a:fld id="{AA785629-72FB-4BD8-A888-872F3B8BC806}" type="datetimeFigureOut">
               <a:rPr lang="en-DE" smtClean="0"/>
-              <a:t>24/01/2024</a:t>
+              <a:t>25/01/2024</a:t>
             </a:fld>
             <a:endParaRPr lang="en-DE"/>
           </a:p>
@@ -3792,7 +3792,10 @@
               <a:rPr lang="en-DE" sz="1200" dirty="0" err="1"/>
               <a:t>amilies</a:t>
             </a:r>
-            <a:endParaRPr lang="en-DE" sz="1200" dirty="0"/>
+            <a:r>
+              <a:rPr lang="en-DE" sz="1200" dirty="0"/>
+              <a:t>✅</a:t>
+            </a:r>
           </a:p>
           <a:p>
             <a:r>
@@ -3932,7 +3935,7 @@
             </a:pPr>
             <a:r>
               <a:rPr lang="en-DE" sz="1200" dirty="0"/>
-              <a:t> Cultures✅</a:t>
+              <a:t>Cultures✅</a:t>
             </a:r>
           </a:p>
           <a:p>

</xml_diff>